<commit_message>
Modifica valori Q e R disuguaglianza e modifica power point parte di disuguaglianza
</commit_message>
<xml_diff>
--- a/cam.pptx
+++ b/cam.pptx
@@ -224,7 +224,7 @@
           <a:p>
             <a:fld id="{56A1F9FD-016A-4124-8D30-0380AF34A37C}" type="datetimeFigureOut">
               <a:rPr lang="it-IT" smtClean="0"/>
-              <a:t>20/07/2025</a:t>
+              <a:t>22/07/2025</a:t>
             </a:fld>
             <a:endParaRPr lang="it-IT"/>
           </a:p>
@@ -638,7 +638,7 @@
           <a:p>
             <a:fld id="{F804CF06-F6AA-4421-AC31-3DD167B981C6}" type="datetime1">
               <a:rPr lang="it-IT" smtClean="0"/>
-              <a:t>20/07/2025</a:t>
+              <a:t>22/07/2025</a:t>
             </a:fld>
             <a:endParaRPr lang="it-IT"/>
           </a:p>
@@ -839,7 +839,7 @@
           <a:p>
             <a:fld id="{3AC0856E-0EEC-4D9D-B3F3-0F60AC013038}" type="datetime1">
               <a:rPr lang="it-IT" smtClean="0"/>
-              <a:t>20/07/2025</a:t>
+              <a:t>22/07/2025</a:t>
             </a:fld>
             <a:endParaRPr lang="it-IT"/>
           </a:p>
@@ -1050,7 +1050,7 @@
           <a:p>
             <a:fld id="{31FBD0A2-0152-4121-A372-5FF90CF4435C}" type="datetime1">
               <a:rPr lang="it-IT" smtClean="0"/>
-              <a:t>20/07/2025</a:t>
+              <a:t>22/07/2025</a:t>
             </a:fld>
             <a:endParaRPr lang="it-IT"/>
           </a:p>
@@ -1251,7 +1251,7 @@
           <a:p>
             <a:fld id="{1C766833-17E6-48D3-9220-DDB953048839}" type="datetime1">
               <a:rPr lang="it-IT" smtClean="0"/>
-              <a:t>20/07/2025</a:t>
+              <a:t>22/07/2025</a:t>
             </a:fld>
             <a:endParaRPr lang="it-IT"/>
           </a:p>
@@ -1529,7 +1529,7 @@
           <a:p>
             <a:fld id="{469C5ADA-E8F5-431F-84DA-235CA7F5C00B}" type="datetime1">
               <a:rPr lang="it-IT" smtClean="0"/>
-              <a:t>20/07/2025</a:t>
+              <a:t>22/07/2025</a:t>
             </a:fld>
             <a:endParaRPr lang="it-IT"/>
           </a:p>
@@ -1797,7 +1797,7 @@
           <a:p>
             <a:fld id="{A1AA3935-594E-4276-85A8-E7A26E6E2775}" type="datetime1">
               <a:rPr lang="it-IT" smtClean="0"/>
-              <a:t>20/07/2025</a:t>
+              <a:t>22/07/2025</a:t>
             </a:fld>
             <a:endParaRPr lang="it-IT"/>
           </a:p>
@@ -2212,7 +2212,7 @@
           <a:p>
             <a:fld id="{982D92E5-5262-4086-8D05-3F8DB806C94C}" type="datetime1">
               <a:rPr lang="it-IT" smtClean="0"/>
-              <a:t>20/07/2025</a:t>
+              <a:t>22/07/2025</a:t>
             </a:fld>
             <a:endParaRPr lang="it-IT"/>
           </a:p>
@@ -2356,7 +2356,7 @@
           <a:p>
             <a:fld id="{00BC9BF5-FDCD-4A4E-8285-15B626CF0A1C}" type="datetime1">
               <a:rPr lang="it-IT" smtClean="0"/>
-              <a:t>20/07/2025</a:t>
+              <a:t>22/07/2025</a:t>
             </a:fld>
             <a:endParaRPr lang="it-IT"/>
           </a:p>
@@ -2472,7 +2472,7 @@
           <a:p>
             <a:fld id="{3C91FFCA-9EDB-4E57-A3C0-4622103A86AF}" type="datetime1">
               <a:rPr lang="it-IT" smtClean="0"/>
-              <a:t>20/07/2025</a:t>
+              <a:t>22/07/2025</a:t>
             </a:fld>
             <a:endParaRPr lang="it-IT"/>
           </a:p>
@@ -2786,7 +2786,7 @@
           <a:p>
             <a:fld id="{BA1124F2-45D5-40AD-B547-4419BD233EA8}" type="datetime1">
               <a:rPr lang="it-IT" smtClean="0"/>
-              <a:t>20/07/2025</a:t>
+              <a:t>22/07/2025</a:t>
             </a:fld>
             <a:endParaRPr lang="it-IT"/>
           </a:p>
@@ -3077,7 +3077,7 @@
           <a:p>
             <a:fld id="{C75E478A-11ED-433A-926B-EB237C1401CE}" type="datetime1">
               <a:rPr lang="it-IT" smtClean="0"/>
-              <a:t>20/07/2025</a:t>
+              <a:t>22/07/2025</a:t>
             </a:fld>
             <a:endParaRPr lang="it-IT"/>
           </a:p>
@@ -3321,7 +3321,7 @@
           <a:p>
             <a:fld id="{3227FB25-0A6E-4247-90E3-2D54F40238BD}" type="datetime1">
               <a:rPr lang="it-IT" smtClean="0"/>
-              <a:t>20/07/2025</a:t>
+              <a:t>22/07/2025</a:t>
             </a:fld>
             <a:endParaRPr lang="it-IT"/>
           </a:p>
@@ -4602,9 +4602,6 @@
           <a:lstStyle/>
           <a:p>
             <a:pPr marR="0" lvl="0" fontAlgn="base">
-              <a:lnSpc>
-                <a:spcPct val="90000"/>
-              </a:lnSpc>
               <a:spcBef>
                 <a:spcPct val="0"/>
               </a:spcBef>
@@ -6944,7 +6941,10 @@
           </a:bodyPr>
           <a:lstStyle/>
           <a:p>
-            <a:pPr marL="0" indent="0">
+            <a:pPr marL="0" indent="0" algn="just">
+              <a:lnSpc>
+                <a:spcPct val="100000"/>
+              </a:lnSpc>
               <a:buNone/>
             </a:pPr>
             <a:r>
@@ -6961,12 +6961,22 @@
             </a:r>
           </a:p>
           <a:p>
+            <a:pPr algn="just">
+              <a:lnSpc>
+                <a:spcPct val="100000"/>
+              </a:lnSpc>
+            </a:pPr>
             <a:r>
               <a:rPr lang="it-IT" sz="2400" dirty="0"/>
               <a:t>ogni stato finale ricade in una regione invariante dove esiste un controllo locale che garantisce il rispetto dei vincoli</a:t>
             </a:r>
           </a:p>
           <a:p>
+            <a:pPr algn="just">
+              <a:lnSpc>
+                <a:spcPct val="100000"/>
+              </a:lnSpc>
+            </a:pPr>
             <a:r>
               <a:rPr lang="it-IT" sz="2400" dirty="0"/>
               <a:t>la funzione di costo terminale </a:t>
@@ -7821,8 +7831,8 @@
           </a:p>
         </p:txBody>
       </p:sp>
-      <mc:AlternateContent xmlns:mc="http://schemas.openxmlformats.org/markup-compatibility/2006" xmlns:a14="http://schemas.microsoft.com/office/drawing/2010/main">
-        <mc:Choice Requires="a14">
+      <mc:AlternateContent xmlns:mc="http://schemas.openxmlformats.org/markup-compatibility/2006">
+        <mc:Choice xmlns:a14="http://schemas.microsoft.com/office/drawing/2010/main" Requires="a14">
           <p:sp>
             <p:nvSpPr>
               <p:cNvPr id="3" name="Segnaposto contenuto 2">
@@ -7851,7 +7861,7 @@
               </a:bodyPr>
               <a:lstStyle/>
               <a:p>
-                <a:pPr marL="0" lvl="0" indent="0" eaLnBrk="0" fontAlgn="base" hangingPunct="0">
+                <a:pPr marL="0" lvl="0" indent="0" algn="just" eaLnBrk="0" fontAlgn="base" hangingPunct="0">
                   <a:lnSpc>
                     <a:spcPct val="100000"/>
                   </a:lnSpc>
@@ -7960,7 +7970,7 @@
                 </a:r>
               </a:p>
               <a:p>
-                <a:pPr marL="0" lvl="0" indent="0" eaLnBrk="0" fontAlgn="base" hangingPunct="0">
+                <a:pPr marL="0" lvl="0" indent="0" algn="just" eaLnBrk="0" fontAlgn="base" hangingPunct="0">
                   <a:lnSpc>
                     <a:spcPct val="100000"/>
                   </a:lnSpc>
@@ -8078,7 +8088,7 @@
                 </a:r>
               </a:p>
               <a:p>
-                <a:pPr marL="0" lvl="0" indent="0" eaLnBrk="0" fontAlgn="base" hangingPunct="0">
+                <a:pPr marL="0" lvl="0" indent="0" algn="just" eaLnBrk="0" fontAlgn="base" hangingPunct="0">
                   <a:lnSpc>
                     <a:spcPct val="100000"/>
                   </a:lnSpc>
@@ -8130,7 +8140,7 @@
                 </a:r>
               </a:p>
               <a:p>
-                <a:pPr marL="0" lvl="0" indent="0" eaLnBrk="0" fontAlgn="base" hangingPunct="0">
+                <a:pPr marL="0" lvl="0" indent="0" algn="just" eaLnBrk="0" fontAlgn="base" hangingPunct="0">
                   <a:lnSpc>
                     <a:spcPct val="100000"/>
                   </a:lnSpc>
@@ -8148,7 +8158,7 @@
                 </a:r>
               </a:p>
               <a:p>
-                <a:pPr marL="0" lvl="0" indent="0" eaLnBrk="0" fontAlgn="base" hangingPunct="0">
+                <a:pPr marL="0" lvl="0" indent="0" algn="just" eaLnBrk="0" fontAlgn="base" hangingPunct="0">
                   <a:lnSpc>
                     <a:spcPct val="100000"/>
                   </a:lnSpc>
@@ -8168,7 +8178,7 @@
             </p:txBody>
           </p:sp>
         </mc:Choice>
-        <mc:Fallback xmlns="">
+        <mc:Fallback>
           <p:sp>
             <p:nvSpPr>
               <p:cNvPr id="3" name="Segnaposto contenuto 2">
@@ -8193,7 +8203,7 @@
               <a:blipFill>
                 <a:blip r:embed="rId2"/>
                 <a:stretch>
-                  <a:fillRect l="-272" t="-296" r="-727"/>
+                  <a:fillRect l="-272" t="-296" r="-272"/>
                 </a:stretch>
               </a:blipFill>
             </p:spPr>
@@ -8759,8 +8769,8 @@
           </a:p>
         </p:txBody>
       </p:sp>
-      <mc:AlternateContent xmlns:mc="http://schemas.openxmlformats.org/markup-compatibility/2006" xmlns:a14="http://schemas.microsoft.com/office/drawing/2010/main">
-        <mc:Choice Requires="a14">
+      <mc:AlternateContent xmlns:mc="http://schemas.openxmlformats.org/markup-compatibility/2006">
+        <mc:Choice xmlns:a14="http://schemas.microsoft.com/office/drawing/2010/main" Requires="a14">
           <p:sp>
             <p:nvSpPr>
               <p:cNvPr id="3" name="Segnaposto contenuto 2">
@@ -8779,8 +8789,8 @@
             </p:nvSpPr>
             <p:spPr>
               <a:xfrm>
-                <a:off x="640080" y="2706624"/>
-                <a:ext cx="6894576" cy="3483864"/>
+                <a:off x="640080" y="2706625"/>
+                <a:ext cx="8263402" cy="2176272"/>
               </a:xfrm>
             </p:spPr>
             <p:txBody>
@@ -8789,55 +8799,49 @@
               </a:bodyPr>
               <a:lstStyle/>
               <a:p>
-                <a:pPr marL="0" indent="0">
+                <a:pPr marL="0" indent="0" algn="just">
                   <a:lnSpc>
                     <a:spcPct val="100000"/>
                   </a:lnSpc>
                   <a:buNone/>
                 </a:pPr>
                 <a:r>
-                  <a:rPr lang="it-IT" sz="1800" dirty="0"/>
+                  <a:rPr lang="it-IT" sz="1600" dirty="0"/>
                   <a:t>La chiamata della funzione «cis» restituisce le disuguaglianze relative a control </a:t>
                 </a:r>
                 <a:r>
-                  <a:rPr lang="it-IT" sz="1800" dirty="0" err="1"/>
+                  <a:rPr lang="it-IT" sz="1600" dirty="0" err="1"/>
                   <a:t>invariant</a:t>
                 </a:r>
                 <a:r>
-                  <a:rPr lang="it-IT" sz="1800" dirty="0"/>
+                  <a:rPr lang="it-IT" sz="1600" dirty="0"/>
                   <a:t> set che verranno rappresentate in un oggetto </a:t>
                 </a:r>
                 <a:r>
-                  <a:rPr lang="it-IT" sz="1800" dirty="0" err="1"/>
+                  <a:rPr lang="it-IT" sz="1600" dirty="0" err="1"/>
                   <a:t>polyedron</a:t>
                 </a:r>
                 <a:r>
-                  <a:rPr lang="it-IT" sz="1800" dirty="0"/>
-                  <a:t> effettuando delle proiezioni dui piani (</a:t>
+                  <a:rPr lang="it-IT" sz="1600" dirty="0"/>
+                  <a:t> effettuando delle proiezioni sui piani (</a:t>
                 </a:r>
                 <a14:m>
                   <m:oMath xmlns:m="http://schemas.openxmlformats.org/officeDocument/2006/math">
                     <m:sSub>
                       <m:sSubPr>
                         <m:ctrlPr>
-                          <a:rPr lang="it-IT" sz="1800" i="1" dirty="0" smtClean="0">
-                            <a:latin typeface="Cambria Math" panose="02040503050406030204" pitchFamily="18" charset="0"/>
-                          </a:rPr>
+                          <a:rPr lang="it-IT" sz="1600" i="1" dirty="0" smtClean="0"/>
                         </m:ctrlPr>
                       </m:sSubPr>
                       <m:e>
                         <m:r>
-                          <a:rPr lang="it-IT" sz="1800" b="0" i="1" dirty="0" smtClean="0">
-                            <a:latin typeface="Cambria Math" panose="02040503050406030204" pitchFamily="18" charset="0"/>
-                          </a:rPr>
+                          <a:rPr lang="it-IT" sz="1600" b="0" i="1" dirty="0" smtClean="0"/>
                           <m:t>h</m:t>
                         </m:r>
                       </m:e>
                       <m:sub>
                         <m:r>
-                          <a:rPr lang="it-IT" sz="1800" b="0" i="1" dirty="0" smtClean="0">
-                            <a:latin typeface="Cambria Math" panose="02040503050406030204" pitchFamily="18" charset="0"/>
-                          </a:rPr>
+                          <a:rPr lang="it-IT" sz="1600" b="0" i="1" dirty="0" smtClean="0"/>
                           <m:t>1</m:t>
                         </m:r>
                       </m:sub>
@@ -8845,7 +8849,7 @@
                   </m:oMath>
                 </a14:m>
                 <a:r>
-                  <a:rPr lang="it-IT" sz="1800" dirty="0"/>
+                  <a:rPr lang="it-IT" sz="1600" dirty="0"/>
                   <a:t>, </a:t>
                 </a:r>
                 <a14:m>
@@ -8853,24 +8857,18 @@
                     <m:sSub>
                       <m:sSubPr>
                         <m:ctrlPr>
-                          <a:rPr lang="it-IT" sz="1800" i="1" dirty="0">
-                            <a:latin typeface="Cambria Math" panose="02040503050406030204" pitchFamily="18" charset="0"/>
-                          </a:rPr>
+                          <a:rPr lang="it-IT" sz="1600" i="1" dirty="0"/>
                         </m:ctrlPr>
                       </m:sSubPr>
                       <m:e>
                         <m:r>
-                          <a:rPr lang="it-IT" sz="1800" i="1" dirty="0">
-                            <a:latin typeface="Cambria Math" panose="02040503050406030204" pitchFamily="18" charset="0"/>
-                          </a:rPr>
+                          <a:rPr lang="it-IT" sz="1600" i="1" dirty="0"/>
                           <m:t>h</m:t>
                         </m:r>
                       </m:e>
                       <m:sub>
                         <m:r>
-                          <a:rPr lang="it-IT" sz="1800" b="0" i="1" dirty="0" smtClean="0">
-                            <a:latin typeface="Cambria Math" panose="02040503050406030204" pitchFamily="18" charset="0"/>
-                          </a:rPr>
+                          <a:rPr lang="it-IT" sz="1600" b="0" i="1" dirty="0" smtClean="0"/>
                           <m:t>3</m:t>
                         </m:r>
                       </m:sub>
@@ -8878,7 +8876,7 @@
                   </m:oMath>
                 </a14:m>
                 <a:r>
-                  <a:rPr lang="it-IT" sz="1800" dirty="0"/>
+                  <a:rPr lang="it-IT" sz="1600" dirty="0"/>
                   <a:t>) e (</a:t>
                 </a:r>
                 <a14:m>
@@ -8886,24 +8884,18 @@
                     <m:sSub>
                       <m:sSubPr>
                         <m:ctrlPr>
-                          <a:rPr lang="it-IT" sz="1800" i="1" dirty="0">
-                            <a:latin typeface="Cambria Math" panose="02040503050406030204" pitchFamily="18" charset="0"/>
-                          </a:rPr>
+                          <a:rPr lang="it-IT" sz="1600" i="1" dirty="0"/>
                         </m:ctrlPr>
                       </m:sSubPr>
                       <m:e>
                         <m:r>
-                          <a:rPr lang="it-IT" sz="1800" i="1" dirty="0">
-                            <a:latin typeface="Cambria Math" panose="02040503050406030204" pitchFamily="18" charset="0"/>
-                          </a:rPr>
+                          <a:rPr lang="it-IT" sz="1600" i="1" dirty="0"/>
                           <m:t>h</m:t>
                         </m:r>
                       </m:e>
                       <m:sub>
                         <m:r>
-                          <a:rPr lang="it-IT" sz="1800" b="0" i="1" dirty="0" smtClean="0">
-                            <a:latin typeface="Cambria Math" panose="02040503050406030204" pitchFamily="18" charset="0"/>
-                          </a:rPr>
+                          <a:rPr lang="it-IT" sz="1600" b="0" i="1" dirty="0" smtClean="0"/>
                           <m:t>2</m:t>
                         </m:r>
                       </m:sub>
@@ -8911,7 +8903,7 @@
                   </m:oMath>
                 </a14:m>
                 <a:r>
-                  <a:rPr lang="it-IT" sz="1800" dirty="0"/>
+                  <a:rPr lang="it-IT" sz="1600" dirty="0"/>
                   <a:t>, </a:t>
                 </a:r>
                 <a14:m>
@@ -8919,24 +8911,18 @@
                     <m:sSub>
                       <m:sSubPr>
                         <m:ctrlPr>
-                          <a:rPr lang="it-IT" sz="1800" i="1" dirty="0">
-                            <a:latin typeface="Cambria Math" panose="02040503050406030204" pitchFamily="18" charset="0"/>
-                          </a:rPr>
+                          <a:rPr lang="it-IT" sz="1600" i="1" dirty="0"/>
                         </m:ctrlPr>
                       </m:sSubPr>
                       <m:e>
                         <m:r>
-                          <a:rPr lang="it-IT" sz="1800" i="1" dirty="0">
-                            <a:latin typeface="Cambria Math" panose="02040503050406030204" pitchFamily="18" charset="0"/>
-                          </a:rPr>
+                          <a:rPr lang="it-IT" sz="1600" i="1" dirty="0"/>
                           <m:t>h</m:t>
                         </m:r>
                       </m:e>
                       <m:sub>
                         <m:r>
-                          <a:rPr lang="it-IT" sz="1800" b="0" i="1" dirty="0" smtClean="0">
-                            <a:latin typeface="Cambria Math" panose="02040503050406030204" pitchFamily="18" charset="0"/>
-                          </a:rPr>
+                          <a:rPr lang="it-IT" sz="1600" b="0" i="1" dirty="0" smtClean="0"/>
                           <m:t>4</m:t>
                         </m:r>
                       </m:sub>
@@ -8944,118 +8930,104 @@
                   </m:oMath>
                 </a14:m>
                 <a:r>
-                  <a:rPr lang="it-IT" sz="1800" dirty="0"/>
+                  <a:rPr lang="it-IT" sz="1600" dirty="0"/>
                   <a:t>).</a:t>
                 </a:r>
               </a:p>
               <a:p>
-                <a:pPr marL="0" indent="0">
+                <a:pPr marL="0" indent="0" algn="just">
                   <a:lnSpc>
                     <a:spcPct val="100000"/>
                   </a:lnSpc>
                   <a:buNone/>
                 </a:pPr>
                 <a:r>
-                  <a:rPr lang="it-IT" sz="1800" dirty="0"/>
+                  <a:rPr lang="it-IT" sz="1600" dirty="0"/>
                   <a:t>I due </a:t>
                 </a:r>
                 <a:r>
-                  <a:rPr lang="it-IT" sz="1800" dirty="0" err="1"/>
+                  <a:rPr lang="it-IT" sz="1600" dirty="0" err="1"/>
                   <a:t>subplot</a:t>
                 </a:r>
                 <a:r>
-                  <a:rPr lang="it-IT" sz="1800" dirty="0"/>
+                  <a:rPr lang="it-IT" sz="1600" dirty="0"/>
                   <a:t> mostrano graficamente le aree ammissibili in cui, al variare dei livelli dei serbatoi, il sistema controllato non violerà mai i vincoli.</a:t>
                 </a:r>
               </a:p>
               <a:p>
-                <a:pPr marL="0" indent="0">
+                <a:pPr marL="0" indent="0" algn="just">
                   <a:lnSpc>
                     <a:spcPct val="100000"/>
                   </a:lnSpc>
                   <a:buNone/>
                 </a:pPr>
                 <a:r>
-                  <a:rPr lang="it-IT" sz="1800" dirty="0"/>
-                  <a:t>è stato scelto di dare un peso molto alto a </a:t>
+                  <a:rPr lang="it-IT" sz="1600" dirty="0"/>
+                  <a:t>Per riflettere la maggior criticità dei serbatoi inferiori </a:t>
+                </a:r>
+                <a14:m>
+                  <m:oMath xmlns:m="http://schemas.openxmlformats.org/officeDocument/2006/math">
+                    <m:r>
+                      <a:rPr lang="it-IT" sz="1600" b="0" i="0" dirty="0" smtClean="0"/>
+                      <m:t>(</m:t>
+                    </m:r>
+                    <m:sSub>
+                      <m:sSubPr>
+                        <m:ctrlPr>
+                          <a:rPr lang="it-IT" sz="1600" i="1" dirty="0"/>
+                        </m:ctrlPr>
+                      </m:sSubPr>
+                      <m:e>
+                        <m:r>
+                          <a:rPr lang="it-IT" sz="1600" i="1" dirty="0"/>
+                          <m:t>h</m:t>
+                        </m:r>
+                      </m:e>
+                      <m:sub>
+                        <m:r>
+                          <a:rPr lang="it-IT" sz="1600" i="1" dirty="0"/>
+                          <m:t>1</m:t>
+                        </m:r>
+                      </m:sub>
+                    </m:sSub>
+                  </m:oMath>
+                </a14:m>
+                <a:r>
+                  <a:rPr lang="it-IT" sz="1600" i="1" dirty="0"/>
+                  <a:t>, </a:t>
                 </a:r>
                 <a14:m>
                   <m:oMath xmlns:m="http://schemas.openxmlformats.org/officeDocument/2006/math">
                     <m:sSub>
                       <m:sSubPr>
                         <m:ctrlPr>
-                          <a:rPr lang="it-IT" sz="1800" i="1" dirty="0">
-                            <a:latin typeface="Cambria Math" panose="02040503050406030204" pitchFamily="18" charset="0"/>
-                          </a:rPr>
+                          <a:rPr lang="it-IT" sz="1600" i="1" dirty="0" smtClean="0"/>
                         </m:ctrlPr>
                       </m:sSubPr>
                       <m:e>
                         <m:r>
-                          <a:rPr lang="it-IT" sz="1800" i="1" dirty="0">
-                            <a:latin typeface="Cambria Math" panose="02040503050406030204" pitchFamily="18" charset="0"/>
-                          </a:rPr>
+                          <a:rPr lang="it-IT" sz="1600" i="1" dirty="0"/>
                           <m:t>h</m:t>
                         </m:r>
                       </m:e>
                       <m:sub>
                         <m:r>
-                          <a:rPr lang="it-IT" sz="1800" i="1" dirty="0">
-                            <a:latin typeface="Cambria Math" panose="02040503050406030204" pitchFamily="18" charset="0"/>
-                          </a:rPr>
-                          <m:t>3</m:t>
+                          <a:rPr lang="it-IT" sz="1600" b="0" i="1" dirty="0" smtClean="0"/>
+                          <m:t>2</m:t>
                         </m:r>
                       </m:sub>
                     </m:sSub>
                   </m:oMath>
                 </a14:m>
                 <a:r>
-                  <a:rPr lang="it-IT" sz="1800" dirty="0"/>
-                  <a:t> e </a:t>
-                </a:r>
-                <a14:m>
-                  <m:oMath xmlns:m="http://schemas.openxmlformats.org/officeDocument/2006/math">
-                    <m:sSub>
-                      <m:sSubPr>
-                        <m:ctrlPr>
-                          <a:rPr lang="it-IT" sz="1800" i="1" dirty="0">
-                            <a:latin typeface="Cambria Math" panose="02040503050406030204" pitchFamily="18" charset="0"/>
-                          </a:rPr>
-                        </m:ctrlPr>
-                      </m:sSubPr>
-                      <m:e>
-                        <m:r>
-                          <a:rPr lang="it-IT" sz="1800" i="1" dirty="0">
-                            <a:latin typeface="Cambria Math" panose="02040503050406030204" pitchFamily="18" charset="0"/>
-                          </a:rPr>
-                          <m:t>h</m:t>
-                        </m:r>
-                      </m:e>
-                      <m:sub>
-                        <m:r>
-                          <a:rPr lang="it-IT" sz="1800" i="1" dirty="0">
-                            <a:latin typeface="Cambria Math" panose="02040503050406030204" pitchFamily="18" charset="0"/>
-                          </a:rPr>
-                          <m:t>4</m:t>
-                        </m:r>
-                      </m:sub>
-                    </m:sSub>
-                    <m:r>
-                      <a:rPr lang="it-IT" sz="1800" i="1" dirty="0">
-                        <a:latin typeface="Cambria Math" panose="02040503050406030204" pitchFamily="18" charset="0"/>
-                      </a:rPr>
-                      <m:t> </m:t>
-                    </m:r>
-                  </m:oMath>
-                </a14:m>
-                <a:r>
-                  <a:rPr lang="it-IT" sz="1800" dirty="0"/>
-                  <a:t>in Q perché qualsiasi scostamento di quei livelli è particolarmente critico. Allo stesso tempo un R elevato penalizza duramente le variazioni di ingresso, spingendo il regolatore ad operare più lentamente.</a:t>
+                  <a:rPr lang="it-IT" sz="1600" dirty="0"/>
+                  <a:t>), è stata adottata la seguente struttura per la funzione di costo:</a:t>
                 </a:r>
               </a:p>
             </p:txBody>
           </p:sp>
         </mc:Choice>
-        <mc:Fallback xmlns="">
+        <mc:Fallback>
           <p:sp>
             <p:nvSpPr>
               <p:cNvPr id="3" name="Segnaposto contenuto 2">
@@ -9074,13 +9046,13 @@
             </p:nvSpPr>
             <p:spPr>
               <a:xfrm>
-                <a:off x="640080" y="2706624"/>
-                <a:ext cx="6894576" cy="3483864"/>
+                <a:off x="640080" y="2706625"/>
+                <a:ext cx="8263402" cy="2176272"/>
               </a:xfrm>
               <a:blipFill>
                 <a:blip r:embed="rId2"/>
                 <a:stretch>
-                  <a:fillRect l="-707" t="-699"/>
+                  <a:fillRect l="-369" t="-840" r="-369"/>
                 </a:stretch>
               </a:blipFill>
             </p:spPr>
@@ -9101,7 +9073,7 @@
       </mc:AlternateContent>
       <p:pic>
         <p:nvPicPr>
-          <p:cNvPr id="6" name="Immagine 5" descr="Immagine che contiene testo, schermata, Carattere, Rettangolo&#10;&#10;Il contenuto generato dall'IA potrebbe non essere corretto.">
+          <p:cNvPr id="6" name="Immagine 5">
             <a:extLst>
               <a:ext uri="{FF2B5EF4-FFF2-40B4-BE49-F238E27FC236}">
                 <a16:creationId xmlns:a16="http://schemas.microsoft.com/office/drawing/2014/main" id="{080DB302-574D-7005-25CF-98B1896C3A65}"/>
@@ -9114,15 +9086,20 @@
           <p:nvPr/>
         </p:nvPicPr>
         <p:blipFill>
-          <a:blip r:embed="rId3"/>
-          <a:stretch>
-            <a:fillRect/>
-          </a:stretch>
+          <a:blip r:embed="rId3">
+            <a:extLst>
+              <a:ext uri="{28A0092B-C50C-407E-A947-70E740481C1C}">
+                <a14:useLocalDpi xmlns:a14="http://schemas.microsoft.com/office/drawing/2010/main" val="0"/>
+              </a:ext>
+            </a:extLst>
+          </a:blip>
+          <a:srcRect/>
+          <a:stretch/>
         </p:blipFill>
         <p:spPr>
           <a:xfrm>
-            <a:off x="7863840" y="749583"/>
-            <a:ext cx="4014216" cy="2589169"/>
+            <a:off x="9041331" y="620124"/>
+            <a:ext cx="3013376" cy="2848086"/>
           </a:xfrm>
           <a:prstGeom prst="rect">
             <a:avLst/>
@@ -9131,7 +9108,7 @@
       </p:pic>
       <p:pic>
         <p:nvPicPr>
-          <p:cNvPr id="8" name="Immagine 7" descr="Immagine che contiene testo, schermata, Carattere, Rettangolo&#10;&#10;Il contenuto generato dall'IA potrebbe non essere corretto.">
+          <p:cNvPr id="8" name="Immagine 7">
             <a:extLst>
               <a:ext uri="{FF2B5EF4-FFF2-40B4-BE49-F238E27FC236}">
                 <a16:creationId xmlns:a16="http://schemas.microsoft.com/office/drawing/2014/main" id="{962D0D91-8968-ADF7-E85A-075F231DED67}"/>
@@ -9144,15 +9121,20 @@
           <p:nvPr/>
         </p:nvPicPr>
         <p:blipFill>
-          <a:blip r:embed="rId4"/>
-          <a:stretch>
-            <a:fillRect/>
-          </a:stretch>
+          <a:blip r:embed="rId4">
+            <a:extLst>
+              <a:ext uri="{28A0092B-C50C-407E-A947-70E740481C1C}">
+                <a14:useLocalDpi xmlns:a14="http://schemas.microsoft.com/office/drawing/2010/main" val="0"/>
+              </a:ext>
+            </a:extLst>
+          </a:blip>
+          <a:srcRect/>
+          <a:stretch/>
         </p:blipFill>
         <p:spPr>
           <a:xfrm>
-            <a:off x="7863840" y="3525330"/>
-            <a:ext cx="3956859" cy="2176272"/>
+            <a:off x="9041503" y="3603652"/>
+            <a:ext cx="3009600" cy="2676596"/>
           </a:xfrm>
           <a:prstGeom prst="rect">
             <a:avLst/>
@@ -9199,41 +9181,383 @@
           </a:p>
         </p:txBody>
       </p:sp>
-      <p:pic>
-        <p:nvPicPr>
-          <p:cNvPr id="10" name="Immagine 9">
-            <a:extLst>
-              <a:ext uri="{FF2B5EF4-FFF2-40B4-BE49-F238E27FC236}">
-                <a16:creationId xmlns:a16="http://schemas.microsoft.com/office/drawing/2014/main" id="{1A157387-469B-C094-2B9F-B2D82EF88159}"/>
-              </a:ext>
-            </a:extLst>
-          </p:cNvPr>
-          <p:cNvPicPr>
-            <a:picLocks noChangeAspect="1"/>
-          </p:cNvPicPr>
-          <p:nvPr/>
-        </p:nvPicPr>
-        <p:blipFill>
-          <a:blip r:embed="rId5"/>
-          <a:stretch>
-            <a:fillRect/>
-          </a:stretch>
-        </p:blipFill>
-        <p:spPr>
-          <a:xfrm>
-            <a:off x="704667" y="6119754"/>
-            <a:ext cx="2629267" cy="419158"/>
-          </a:xfrm>
-          <a:prstGeom prst="rect">
-            <a:avLst/>
-          </a:prstGeom>
-          <a:ln>
-            <a:solidFill>
-              <a:schemeClr val="tx1"/>
-            </a:solidFill>
-          </a:ln>
-        </p:spPr>
-      </p:pic>
+      <mc:AlternateContent xmlns:mc="http://schemas.openxmlformats.org/markup-compatibility/2006">
+        <mc:Choice xmlns:a14="http://schemas.microsoft.com/office/drawing/2010/main" Requires="a14">
+          <p:sp>
+            <p:nvSpPr>
+              <p:cNvPr id="7" name="Segnaposto contenuto 2">
+                <a:extLst>
+                  <a:ext uri="{FF2B5EF4-FFF2-40B4-BE49-F238E27FC236}">
+                    <a16:creationId xmlns:a16="http://schemas.microsoft.com/office/drawing/2014/main" id="{24351AC5-39D2-E209-69F6-BD57B333C368}"/>
+                  </a:ext>
+                </a:extLst>
+              </p:cNvPr>
+              <p:cNvSpPr txBox="1">
+                <a:spLocks/>
+              </p:cNvSpPr>
+              <p:nvPr/>
+            </p:nvSpPr>
+            <p:spPr>
+              <a:xfrm>
+                <a:off x="640080" y="4813096"/>
+                <a:ext cx="8263402" cy="1397351"/>
+              </a:xfrm>
+              <a:prstGeom prst="rect">
+                <a:avLst/>
+              </a:prstGeom>
+            </p:spPr>
+            <p:txBody>
+              <a:bodyPr vert="horz" lIns="91440" tIns="45720" rIns="91440" bIns="45720" rtlCol="0">
+                <a:normAutofit/>
+              </a:bodyPr>
+              <a:lstStyle>
+                <a:lvl1pPr marL="228600" indent="-228600" algn="l" defTabSz="914400" rtl="0" eaLnBrk="1" latinLnBrk="0" hangingPunct="1">
+                  <a:lnSpc>
+                    <a:spcPct val="90000"/>
+                  </a:lnSpc>
+                  <a:spcBef>
+                    <a:spcPts val="1000"/>
+                  </a:spcBef>
+                  <a:buFont typeface="Arial" panose="020B0604020202020204" pitchFamily="34" charset="0"/>
+                  <a:buChar char="•"/>
+                  <a:defRPr sz="2800" kern="1200">
+                    <a:solidFill>
+                      <a:schemeClr val="tx1"/>
+                    </a:solidFill>
+                    <a:latin typeface="+mn-lt"/>
+                    <a:ea typeface="+mn-ea"/>
+                    <a:cs typeface="+mn-cs"/>
+                  </a:defRPr>
+                </a:lvl1pPr>
+                <a:lvl2pPr marL="685800" indent="-228600" algn="l" defTabSz="914400" rtl="0" eaLnBrk="1" latinLnBrk="0" hangingPunct="1">
+                  <a:lnSpc>
+                    <a:spcPct val="90000"/>
+                  </a:lnSpc>
+                  <a:spcBef>
+                    <a:spcPts val="500"/>
+                  </a:spcBef>
+                  <a:buFont typeface="Arial" panose="020B0604020202020204" pitchFamily="34" charset="0"/>
+                  <a:buChar char="•"/>
+                  <a:defRPr sz="2400" kern="1200">
+                    <a:solidFill>
+                      <a:schemeClr val="tx1"/>
+                    </a:solidFill>
+                    <a:latin typeface="+mn-lt"/>
+                    <a:ea typeface="+mn-ea"/>
+                    <a:cs typeface="+mn-cs"/>
+                  </a:defRPr>
+                </a:lvl2pPr>
+                <a:lvl3pPr marL="1143000" indent="-228600" algn="l" defTabSz="914400" rtl="0" eaLnBrk="1" latinLnBrk="0" hangingPunct="1">
+                  <a:lnSpc>
+                    <a:spcPct val="90000"/>
+                  </a:lnSpc>
+                  <a:spcBef>
+                    <a:spcPts val="500"/>
+                  </a:spcBef>
+                  <a:buFont typeface="Arial" panose="020B0604020202020204" pitchFamily="34" charset="0"/>
+                  <a:buChar char="•"/>
+                  <a:defRPr sz="2000" kern="1200">
+                    <a:solidFill>
+                      <a:schemeClr val="tx1"/>
+                    </a:solidFill>
+                    <a:latin typeface="+mn-lt"/>
+                    <a:ea typeface="+mn-ea"/>
+                    <a:cs typeface="+mn-cs"/>
+                  </a:defRPr>
+                </a:lvl3pPr>
+                <a:lvl4pPr marL="1600200" indent="-228600" algn="l" defTabSz="914400" rtl="0" eaLnBrk="1" latinLnBrk="0" hangingPunct="1">
+                  <a:lnSpc>
+                    <a:spcPct val="90000"/>
+                  </a:lnSpc>
+                  <a:spcBef>
+                    <a:spcPts val="500"/>
+                  </a:spcBef>
+                  <a:buFont typeface="Arial" panose="020B0604020202020204" pitchFamily="34" charset="0"/>
+                  <a:buChar char="•"/>
+                  <a:defRPr sz="1800" kern="1200">
+                    <a:solidFill>
+                      <a:schemeClr val="tx1"/>
+                    </a:solidFill>
+                    <a:latin typeface="+mn-lt"/>
+                    <a:ea typeface="+mn-ea"/>
+                    <a:cs typeface="+mn-cs"/>
+                  </a:defRPr>
+                </a:lvl4pPr>
+                <a:lvl5pPr marL="2057400" indent="-228600" algn="l" defTabSz="914400" rtl="0" eaLnBrk="1" latinLnBrk="0" hangingPunct="1">
+                  <a:lnSpc>
+                    <a:spcPct val="90000"/>
+                  </a:lnSpc>
+                  <a:spcBef>
+                    <a:spcPts val="500"/>
+                  </a:spcBef>
+                  <a:buFont typeface="Arial" panose="020B0604020202020204" pitchFamily="34" charset="0"/>
+                  <a:buChar char="•"/>
+                  <a:defRPr sz="1800" kern="1200">
+                    <a:solidFill>
+                      <a:schemeClr val="tx1"/>
+                    </a:solidFill>
+                    <a:latin typeface="+mn-lt"/>
+                    <a:ea typeface="+mn-ea"/>
+                    <a:cs typeface="+mn-cs"/>
+                  </a:defRPr>
+                </a:lvl5pPr>
+                <a:lvl6pPr marL="2514600" indent="-228600" algn="l" defTabSz="914400" rtl="0" eaLnBrk="1" latinLnBrk="0" hangingPunct="1">
+                  <a:lnSpc>
+                    <a:spcPct val="90000"/>
+                  </a:lnSpc>
+                  <a:spcBef>
+                    <a:spcPts val="500"/>
+                  </a:spcBef>
+                  <a:buFont typeface="Arial" panose="020B0604020202020204" pitchFamily="34" charset="0"/>
+                  <a:buChar char="•"/>
+                  <a:defRPr sz="1800" kern="1200">
+                    <a:solidFill>
+                      <a:schemeClr val="tx1"/>
+                    </a:solidFill>
+                    <a:latin typeface="+mn-lt"/>
+                    <a:ea typeface="+mn-ea"/>
+                    <a:cs typeface="+mn-cs"/>
+                  </a:defRPr>
+                </a:lvl6pPr>
+                <a:lvl7pPr marL="2971800" indent="-228600" algn="l" defTabSz="914400" rtl="0" eaLnBrk="1" latinLnBrk="0" hangingPunct="1">
+                  <a:lnSpc>
+                    <a:spcPct val="90000"/>
+                  </a:lnSpc>
+                  <a:spcBef>
+                    <a:spcPts val="500"/>
+                  </a:spcBef>
+                  <a:buFont typeface="Arial" panose="020B0604020202020204" pitchFamily="34" charset="0"/>
+                  <a:buChar char="•"/>
+                  <a:defRPr sz="1800" kern="1200">
+                    <a:solidFill>
+                      <a:schemeClr val="tx1"/>
+                    </a:solidFill>
+                    <a:latin typeface="+mn-lt"/>
+                    <a:ea typeface="+mn-ea"/>
+                    <a:cs typeface="+mn-cs"/>
+                  </a:defRPr>
+                </a:lvl7pPr>
+                <a:lvl8pPr marL="3429000" indent="-228600" algn="l" defTabSz="914400" rtl="0" eaLnBrk="1" latinLnBrk="0" hangingPunct="1">
+                  <a:lnSpc>
+                    <a:spcPct val="90000"/>
+                  </a:lnSpc>
+                  <a:spcBef>
+                    <a:spcPts val="500"/>
+                  </a:spcBef>
+                  <a:buFont typeface="Arial" panose="020B0604020202020204" pitchFamily="34" charset="0"/>
+                  <a:buChar char="•"/>
+                  <a:defRPr sz="1800" kern="1200">
+                    <a:solidFill>
+                      <a:schemeClr val="tx1"/>
+                    </a:solidFill>
+                    <a:latin typeface="+mn-lt"/>
+                    <a:ea typeface="+mn-ea"/>
+                    <a:cs typeface="+mn-cs"/>
+                  </a:defRPr>
+                </a:lvl8pPr>
+                <a:lvl9pPr marL="3886200" indent="-228600" algn="l" defTabSz="914400" rtl="0" eaLnBrk="1" latinLnBrk="0" hangingPunct="1">
+                  <a:lnSpc>
+                    <a:spcPct val="90000"/>
+                  </a:lnSpc>
+                  <a:spcBef>
+                    <a:spcPts val="500"/>
+                  </a:spcBef>
+                  <a:buFont typeface="Arial" panose="020B0604020202020204" pitchFamily="34" charset="0"/>
+                  <a:buChar char="•"/>
+                  <a:defRPr sz="1800" kern="1200">
+                    <a:solidFill>
+                      <a:schemeClr val="tx1"/>
+                    </a:solidFill>
+                    <a:latin typeface="+mn-lt"/>
+                    <a:ea typeface="+mn-ea"/>
+                    <a:cs typeface="+mn-cs"/>
+                  </a:defRPr>
+                </a:lvl9pPr>
+              </a:lstStyle>
+              <a:p>
+                <a:pPr algn="just">
+                  <a:lnSpc>
+                    <a:spcPct val="100000"/>
+                  </a:lnSpc>
+                </a:pPr>
+                <a:r>
+                  <a:rPr lang="it-IT" sz="1600" dirty="0"/>
+                  <a:t>Q = </a:t>
+                </a:r>
+                <a:r>
+                  <a:rPr lang="it-IT" sz="1600" dirty="0" err="1"/>
+                  <a:t>diag</a:t>
+                </a:r>
+                <a:r>
+                  <a:rPr lang="it-IT" sz="1600" dirty="0"/>
+                  <a:t>([100,100,1,1])</a:t>
+                </a:r>
+              </a:p>
+              <a:p>
+                <a:pPr lvl="1" algn="just">
+                  <a:lnSpc>
+                    <a:spcPct val="100000"/>
+                  </a:lnSpc>
+                  <a:buFont typeface="Wingdings" panose="05000000000000000000" pitchFamily="2" charset="2"/>
+                  <a:buChar char="§"/>
+                </a:pPr>
+                <a:r>
+                  <a:rPr lang="it-IT" sz="1200" dirty="0"/>
+                  <a:t>Pesi elevati su </a:t>
+                </a:r>
+                <a14:m>
+                  <m:oMath xmlns:m="http://schemas.openxmlformats.org/officeDocument/2006/math">
+                    <m:r>
+                      <a:rPr lang="it-IT" sz="1200" dirty="0">
+                        <a:latin typeface="Cambria Math" panose="02040503050406030204" pitchFamily="18" charset="0"/>
+                      </a:rPr>
+                      <m:t>(</m:t>
+                    </m:r>
+                    <m:sSub>
+                      <m:sSubPr>
+                        <m:ctrlPr>
+                          <a:rPr lang="it-IT" sz="1200" i="1" dirty="0">
+                            <a:latin typeface="Cambria Math" panose="02040503050406030204" pitchFamily="18" charset="0"/>
+                          </a:rPr>
+                        </m:ctrlPr>
+                      </m:sSubPr>
+                      <m:e>
+                        <m:r>
+                          <a:rPr lang="it-IT" sz="1200" i="1" dirty="0">
+                            <a:latin typeface="Cambria Math" panose="02040503050406030204" pitchFamily="18" charset="0"/>
+                          </a:rPr>
+                          <m:t>h</m:t>
+                        </m:r>
+                      </m:e>
+                      <m:sub>
+                        <m:r>
+                          <a:rPr lang="it-IT" sz="1200" i="1" dirty="0">
+                            <a:latin typeface="Cambria Math" panose="02040503050406030204" pitchFamily="18" charset="0"/>
+                          </a:rPr>
+                          <m:t>1</m:t>
+                        </m:r>
+                      </m:sub>
+                    </m:sSub>
+                  </m:oMath>
+                </a14:m>
+                <a:r>
+                  <a:rPr lang="it-IT" sz="1200" i="1" dirty="0"/>
+                  <a:t>, </a:t>
+                </a:r>
+                <a14:m>
+                  <m:oMath xmlns:m="http://schemas.openxmlformats.org/officeDocument/2006/math">
+                    <m:sSub>
+                      <m:sSubPr>
+                        <m:ctrlPr>
+                          <a:rPr lang="it-IT" sz="1200" i="1" dirty="0">
+                            <a:latin typeface="Cambria Math" panose="02040503050406030204" pitchFamily="18" charset="0"/>
+                          </a:rPr>
+                        </m:ctrlPr>
+                      </m:sSubPr>
+                      <m:e>
+                        <m:r>
+                          <a:rPr lang="it-IT" sz="1200" i="1" dirty="0">
+                            <a:latin typeface="Cambria Math" panose="02040503050406030204" pitchFamily="18" charset="0"/>
+                          </a:rPr>
+                          <m:t>h</m:t>
+                        </m:r>
+                      </m:e>
+                      <m:sub>
+                        <m:r>
+                          <a:rPr lang="it-IT" sz="1200" i="1" dirty="0">
+                            <a:latin typeface="Cambria Math" panose="02040503050406030204" pitchFamily="18" charset="0"/>
+                          </a:rPr>
+                          <m:t>2</m:t>
+                        </m:r>
+                      </m:sub>
+                    </m:sSub>
+                  </m:oMath>
+                </a14:m>
+                <a:r>
+                  <a:rPr lang="it-IT" sz="1200" dirty="0"/>
+                  <a:t>) che rappresentano i livelli più critici da controllare.</a:t>
+                </a:r>
+              </a:p>
+              <a:p>
+                <a:pPr algn="just">
+                  <a:lnSpc>
+                    <a:spcPct val="100000"/>
+                  </a:lnSpc>
+                </a:pPr>
+                <a:r>
+                  <a:rPr lang="it-IT" sz="1600" dirty="0"/>
+                  <a:t>R = 10 *</a:t>
+                </a:r>
+                <a:r>
+                  <a:rPr lang="it-IT" sz="1600" dirty="0" err="1"/>
+                  <a:t>eye</a:t>
+                </a:r>
+                <a:r>
+                  <a:rPr lang="it-IT" sz="1600" dirty="0"/>
+                  <a:t>(2)</a:t>
+                </a:r>
+              </a:p>
+              <a:p>
+                <a:pPr lvl="1" algn="just">
+                  <a:lnSpc>
+                    <a:spcPct val="100000"/>
+                  </a:lnSpc>
+                  <a:buFont typeface="Wingdings" panose="05000000000000000000" pitchFamily="2" charset="2"/>
+                  <a:buChar char="§"/>
+                </a:pPr>
+                <a:r>
+                  <a:rPr lang="it-IT" sz="1200" dirty="0"/>
+                  <a:t>Penalizzazione moderata sulle variazioni dell’ingresso per evitare comandi troppo aggressivi alle pompe.</a:t>
+                </a:r>
+              </a:p>
+            </p:txBody>
+          </p:sp>
+        </mc:Choice>
+        <mc:Fallback>
+          <p:sp>
+            <p:nvSpPr>
+              <p:cNvPr id="7" name="Segnaposto contenuto 2">
+                <a:extLst>
+                  <a:ext uri="{FF2B5EF4-FFF2-40B4-BE49-F238E27FC236}">
+                    <a16:creationId xmlns:a16="http://schemas.microsoft.com/office/drawing/2014/main" id="{24351AC5-39D2-E209-69F6-BD57B333C368}"/>
+                  </a:ext>
+                </a:extLst>
+              </p:cNvPr>
+              <p:cNvSpPr txBox="1">
+                <a:spLocks noRot="1" noChangeAspect="1" noMove="1" noResize="1" noEditPoints="1" noAdjustHandles="1" noChangeArrowheads="1" noChangeShapeType="1" noTextEdit="1"/>
+              </p:cNvSpPr>
+              <p:nvPr/>
+            </p:nvSpPr>
+            <p:spPr>
+              <a:xfrm>
+                <a:off x="640080" y="4813096"/>
+                <a:ext cx="8263402" cy="1397351"/>
+              </a:xfrm>
+              <a:prstGeom prst="rect">
+                <a:avLst/>
+              </a:prstGeom>
+              <a:blipFill>
+                <a:blip r:embed="rId5"/>
+                <a:stretch>
+                  <a:fillRect l="-295" t="-1310"/>
+                </a:stretch>
+              </a:blipFill>
+            </p:spPr>
+            <p:txBody>
+              <a:bodyPr/>
+              <a:lstStyle/>
+              <a:p>
+                <a:r>
+                  <a:rPr lang="it-IT">
+                    <a:noFill/>
+                  </a:rPr>
+                  <a:t> </a:t>
+                </a:r>
+              </a:p>
+            </p:txBody>
+          </p:sp>
+        </mc:Fallback>
+      </mc:AlternateContent>
     </p:spTree>
     <p:extLst>
       <p:ext uri="{BB962C8B-B14F-4D97-AF65-F5344CB8AC3E}">
@@ -9361,13 +9685,21 @@
           <a:lstStyle/>
           <a:p>
             <a:r>
-              <a:rPr lang="it-IT" sz="4600"/>
-              <a:t>Calcolo N-step controllable set</a:t>
+              <a:rPr lang="it-IT" sz="4600" dirty="0"/>
+              <a:t>Calcolo N-step </a:t>
+            </a:r>
+            <a:r>
+              <a:rPr lang="it-IT" sz="4600" dirty="0" err="1"/>
+              <a:t>controllable</a:t>
+            </a:r>
+            <a:r>
+              <a:rPr lang="it-IT" sz="4600" dirty="0"/>
+              <a:t> set</a:t>
             </a:r>
             <a:br>
-              <a:rPr lang="it-IT" sz="4600"/>
+              <a:rPr lang="it-IT" sz="4600" dirty="0"/>
             </a:br>
-            <a:endParaRPr lang="it-IT" sz="4600"/>
+            <a:endParaRPr lang="it-IT" sz="4600" dirty="0"/>
           </a:p>
         </p:txBody>
       </p:sp>
@@ -10033,8 +10365,8 @@
           </a:p>
         </p:txBody>
       </p:sp>
-      <mc:AlternateContent xmlns:mc="http://schemas.openxmlformats.org/markup-compatibility/2006" xmlns:a14="http://schemas.microsoft.com/office/drawing/2010/main">
-        <mc:Choice Requires="a14">
+      <mc:AlternateContent xmlns:mc="http://schemas.openxmlformats.org/markup-compatibility/2006">
+        <mc:Choice xmlns:a14="http://schemas.microsoft.com/office/drawing/2010/main" Requires="a14">
           <p:sp>
             <p:nvSpPr>
               <p:cNvPr id="7" name="Rectangle 1">
@@ -10097,7 +10429,7 @@
               </a:bodyPr>
               <a:lstStyle/>
               <a:p>
-                <a:pPr marL="0" marR="0" lvl="0" indent="0" defTabSz="914400" rtl="0" eaLnBrk="0" fontAlgn="base" latinLnBrk="0" hangingPunct="0">
+                <a:pPr marL="0" marR="0" lvl="0" indent="0" algn="just" defTabSz="914400" rtl="0" eaLnBrk="0" fontAlgn="base" latinLnBrk="0" hangingPunct="0">
                   <a:spcBef>
                     <a:spcPct val="0"/>
                   </a:spcBef>
@@ -10139,7 +10471,7 @@
                 </a:r>
               </a:p>
               <a:p>
-                <a:pPr marL="0" marR="0" lvl="0" indent="0" defTabSz="914400" rtl="0" eaLnBrk="0" fontAlgn="base" latinLnBrk="0" hangingPunct="0">
+                <a:pPr marL="0" marR="0" lvl="0" indent="0" algn="just" defTabSz="914400" rtl="0" eaLnBrk="0" fontAlgn="base" latinLnBrk="0" hangingPunct="0">
                   <a:spcBef>
                     <a:spcPct val="0"/>
                   </a:spcBef>
@@ -10181,7 +10513,7 @@
                 </a:r>
               </a:p>
               <a:p>
-                <a:pPr eaLnBrk="0" fontAlgn="base" hangingPunct="0">
+                <a:pPr algn="just" eaLnBrk="0" fontAlgn="base" hangingPunct="0">
                   <a:spcBef>
                     <a:spcPct val="0"/>
                   </a:spcBef>
@@ -10300,7 +10632,7 @@
                 </a:r>
               </a:p>
               <a:p>
-                <a:pPr eaLnBrk="0" fontAlgn="base" hangingPunct="0">
+                <a:pPr algn="just" eaLnBrk="0" fontAlgn="base" hangingPunct="0">
                   <a:spcBef>
                     <a:spcPct val="0"/>
                   </a:spcBef>
@@ -10382,7 +10714,7 @@
                 </a:r>
               </a:p>
               <a:p>
-                <a:pPr marL="0" marR="0" lvl="0" indent="0" defTabSz="914400" rtl="0" eaLnBrk="0" fontAlgn="base" latinLnBrk="0" hangingPunct="0">
+                <a:pPr marL="0" marR="0" lvl="0" indent="0" algn="just" defTabSz="914400" rtl="0" eaLnBrk="0" fontAlgn="base" latinLnBrk="0" hangingPunct="0">
                   <a:spcBef>
                     <a:spcPct val="0"/>
                   </a:spcBef>
@@ -10487,7 +10819,7 @@
                 </a:r>
               </a:p>
               <a:p>
-                <a:pPr marL="0" marR="0" lvl="0" indent="0" defTabSz="914400" rtl="0" eaLnBrk="0" fontAlgn="base" latinLnBrk="0" hangingPunct="0">
+                <a:pPr marL="0" marR="0" lvl="0" indent="0" algn="just" defTabSz="914400" rtl="0" eaLnBrk="0" fontAlgn="base" latinLnBrk="0" hangingPunct="0">
                   <a:spcBef>
                     <a:spcPct val="0"/>
                   </a:spcBef>
@@ -10507,7 +10839,31 @@
                     </a:ln>
                     <a:effectLst/>
                   </a:rPr>
-                  <a:t>Ripetendo il processo per N passi, l’insieme si espande gradualmente, includendo tutti gli stati da cui è garantito raggiungere il set target in al più N mosse. Il risultato finale è il N-step </a:t>
+                  <a:t>Ripetendo il processo per N passi, l’insieme si espande gradualmente, includendo tutti gli stati da cui è garantito raggiungere il set target in al più N mosse.</a:t>
+                </a:r>
+              </a:p>
+              <a:p>
+                <a:pPr marL="0" marR="0" lvl="0" indent="0" algn="just" defTabSz="914400" rtl="0" eaLnBrk="0" fontAlgn="base" latinLnBrk="0" hangingPunct="0">
+                  <a:spcBef>
+                    <a:spcPct val="0"/>
+                  </a:spcBef>
+                  <a:spcAft>
+                    <a:spcPts val="600"/>
+                  </a:spcAft>
+                  <a:buClrTx/>
+                  <a:buSzTx/>
+                  <a:buFontTx/>
+                  <a:buNone/>
+                  <a:tabLst/>
+                </a:pPr>
+                <a:r>
+                  <a:rPr kumimoji="0" lang="it-IT" altLang="it-IT" sz="1500" i="0" u="none" strike="noStrike" cap="none" normalizeH="0" baseline="0" dirty="0">
+                    <a:ln>
+                      <a:noFill/>
+                    </a:ln>
+                    <a:effectLst/>
+                  </a:rPr>
+                  <a:t>Il risultato finale è il N-step </a:t>
                 </a:r>
                 <a:r>
                   <a:rPr kumimoji="0" lang="it-IT" altLang="it-IT" sz="1500" i="0" u="none" strike="noStrike" cap="none" normalizeH="0" baseline="0" dirty="0" err="1">
@@ -10531,7 +10887,7 @@
             </p:txBody>
           </p:sp>
         </mc:Choice>
-        <mc:Fallback xmlns="">
+        <mc:Fallback>
           <p:sp>
             <p:nvSpPr>
               <p:cNvPr id="7" name="Rectangle 1">
@@ -10559,7 +10915,7 @@
               <a:blipFill>
                 <a:blip r:embed="rId2"/>
                 <a:stretch>
-                  <a:fillRect l="-363" t="-740"/>
+                  <a:fillRect l="-363" t="-740" r="-363"/>
                 </a:stretch>
               </a:blipFill>
               <a:extLst>
@@ -10794,7 +11150,7 @@
         <p:spPr>
           <a:xfrm>
             <a:off x="640080" y="329184"/>
-            <a:ext cx="6894576" cy="1783080"/>
+            <a:ext cx="8413178" cy="1783080"/>
           </a:xfrm>
         </p:spPr>
         <p:txBody>
@@ -11161,136 +11517,318 @@
           </a:p>
         </p:txBody>
       </p:sp>
-      <p:sp>
-        <p:nvSpPr>
-          <p:cNvPr id="3" name="Segnaposto contenuto 2">
-            <a:extLst>
-              <a:ext uri="{FF2B5EF4-FFF2-40B4-BE49-F238E27FC236}">
-                <a16:creationId xmlns:a16="http://schemas.microsoft.com/office/drawing/2014/main" id="{1AB11CCA-47B4-9509-7533-3E635B5D12DE}"/>
-              </a:ext>
-            </a:extLst>
-          </p:cNvPr>
-          <p:cNvSpPr>
-            <a:spLocks noGrp="1"/>
-          </p:cNvSpPr>
-          <p:nvPr>
-            <p:ph idx="1"/>
-          </p:nvPr>
-        </p:nvSpPr>
-        <p:spPr>
-          <a:xfrm>
-            <a:off x="640080" y="2706624"/>
-            <a:ext cx="6894576" cy="3483864"/>
-          </a:xfrm>
-        </p:spPr>
-        <p:txBody>
-          <a:bodyPr>
-            <a:normAutofit/>
-          </a:bodyPr>
-          <a:lstStyle/>
-          <a:p>
-            <a:pPr marL="0" lvl="0" indent="0" eaLnBrk="0" fontAlgn="base" hangingPunct="0">
-              <a:lnSpc>
-                <a:spcPct val="100000"/>
-              </a:lnSpc>
-              <a:spcBef>
-                <a:spcPct val="0"/>
-              </a:spcBef>
-              <a:spcAft>
-                <a:spcPct val="0"/>
-              </a:spcAft>
-              <a:buNone/>
-            </a:pPr>
-            <a:r>
-              <a:rPr lang="it-IT" altLang="it-IT" sz="1700" dirty="0"/>
-              <a:t>Per N = 4 passi viene chiamata la funzione </a:t>
-            </a:r>
-            <a:r>
-              <a:rPr lang="it-IT" altLang="it-IT" sz="1700" dirty="0" err="1"/>
-              <a:t>controllable_set</a:t>
-            </a:r>
-            <a:r>
-              <a:rPr lang="it-IT" altLang="it-IT" sz="1700" dirty="0"/>
-              <a:t> usando il CIS come set target e in maniera da ottenere le disuguaglianze (</a:t>
-            </a:r>
-            <a:r>
-              <a:rPr lang="it-IT" altLang="it-IT" sz="1700" dirty="0" err="1"/>
-              <a:t>Np_steps_H</a:t>
-            </a:r>
-            <a:r>
-              <a:rPr lang="it-IT" altLang="it-IT" sz="1700" dirty="0"/>
-              <a:t>, </a:t>
-            </a:r>
-            <a:r>
-              <a:rPr lang="it-IT" altLang="it-IT" sz="1700" dirty="0" err="1"/>
-              <a:t>Np_steps_h</a:t>
-            </a:r>
-            <a:r>
-              <a:rPr lang="it-IT" altLang="it-IT" sz="1700" dirty="0"/>
-              <a:t>) che definiscono il poliedro di tutti gli stati da cui in al massimo 4 mosse, rispettando i vincoli, si entra nel CIS. Viene trasformato questo risultato in un oggetto </a:t>
-            </a:r>
-            <a:r>
-              <a:rPr lang="it-IT" altLang="it-IT" sz="1700" dirty="0" err="1"/>
-              <a:t>Polyhedron</a:t>
-            </a:r>
-            <a:r>
-              <a:rPr lang="it-IT" altLang="it-IT" sz="1700" dirty="0"/>
-              <a:t> proiettando la regione sui piani (</a:t>
-            </a:r>
-            <a:r>
-              <a:rPr lang="it-IT" altLang="it-IT" sz="1700" dirty="0" err="1"/>
-              <a:t>h₁,h</a:t>
-            </a:r>
-            <a:r>
-              <a:rPr lang="it-IT" altLang="it-IT" sz="1700" dirty="0"/>
-              <a:t>₃) e (</a:t>
-            </a:r>
-            <a:r>
-              <a:rPr lang="it-IT" altLang="it-IT" sz="1700" dirty="0" err="1"/>
-              <a:t>h₂,h</a:t>
-            </a:r>
-            <a:r>
-              <a:rPr lang="it-IT" altLang="it-IT" sz="1700" dirty="0"/>
-              <a:t>₄).</a:t>
-            </a:r>
-          </a:p>
-          <a:p>
-            <a:pPr marL="0" lvl="0" indent="0" eaLnBrk="0" fontAlgn="base" hangingPunct="0">
-              <a:lnSpc>
-                <a:spcPct val="100000"/>
-              </a:lnSpc>
-              <a:spcBef>
-                <a:spcPct val="0"/>
-              </a:spcBef>
-              <a:spcAft>
-                <a:spcPct val="0"/>
-              </a:spcAft>
-              <a:buNone/>
-            </a:pPr>
-            <a:r>
-              <a:rPr lang="it-IT" altLang="it-IT" sz="1700" dirty="0"/>
-              <a:t>Nei due </a:t>
-            </a:r>
-            <a:r>
-              <a:rPr lang="it-IT" altLang="it-IT" sz="1700" dirty="0" err="1"/>
-              <a:t>subplot</a:t>
-            </a:r>
-            <a:r>
-              <a:rPr lang="it-IT" altLang="it-IT" sz="1700" dirty="0"/>
-              <a:t> vengono visualizzati insieme il CIS e l’N-step set e si può osservare che l’N-step </a:t>
-            </a:r>
-            <a:r>
-              <a:rPr lang="it-IT" altLang="it-IT" sz="1700" dirty="0" err="1"/>
-              <a:t>controllable</a:t>
-            </a:r>
-            <a:r>
-              <a:rPr lang="it-IT" altLang="it-IT" sz="1700" dirty="0"/>
-              <a:t> set ingloba il CIS e si estende al di fuori: quelle aree extra rappresentano combinazioni di livelli iniziali non stazionarie ma comunque riportabili in sicurezza in 4 passi. </a:t>
-            </a:r>
-            <a:endParaRPr lang="it-IT" sz="2200" dirty="0"/>
-          </a:p>
-        </p:txBody>
-      </p:sp>
+      <mc:AlternateContent xmlns:mc="http://schemas.openxmlformats.org/markup-compatibility/2006">
+        <mc:Choice xmlns:a14="http://schemas.microsoft.com/office/drawing/2010/main" Requires="a14">
+          <p:sp>
+            <p:nvSpPr>
+              <p:cNvPr id="3" name="Segnaposto contenuto 2">
+                <a:extLst>
+                  <a:ext uri="{FF2B5EF4-FFF2-40B4-BE49-F238E27FC236}">
+                    <a16:creationId xmlns:a16="http://schemas.microsoft.com/office/drawing/2014/main" id="{1AB11CCA-47B4-9509-7533-3E635B5D12DE}"/>
+                  </a:ext>
+                </a:extLst>
+              </p:cNvPr>
+              <p:cNvSpPr>
+                <a:spLocks noGrp="1"/>
+              </p:cNvSpPr>
+              <p:nvPr>
+                <p:ph idx="1"/>
+              </p:nvPr>
+            </p:nvSpPr>
+            <p:spPr>
+              <a:xfrm>
+                <a:off x="640080" y="2706624"/>
+                <a:ext cx="6894576" cy="3483864"/>
+              </a:xfrm>
+            </p:spPr>
+            <p:txBody>
+              <a:bodyPr>
+                <a:normAutofit/>
+              </a:bodyPr>
+              <a:lstStyle/>
+              <a:p>
+                <a:pPr marL="0" lvl="0" indent="0" algn="just" eaLnBrk="0" fontAlgn="base" hangingPunct="0">
+                  <a:lnSpc>
+                    <a:spcPct val="100000"/>
+                  </a:lnSpc>
+                  <a:spcBef>
+                    <a:spcPct val="0"/>
+                  </a:spcBef>
+                  <a:spcAft>
+                    <a:spcPct val="0"/>
+                  </a:spcAft>
+                  <a:buNone/>
+                </a:pPr>
+                <a:r>
+                  <a:rPr lang="it-IT" altLang="it-IT" sz="1700" dirty="0"/>
+                  <a:t>Per N = 3 passi viene chiamata la funzione </a:t>
+                </a:r>
+                <a:r>
+                  <a:rPr lang="it-IT" altLang="it-IT" sz="1700" dirty="0" err="1"/>
+                  <a:t>controllable_set</a:t>
+                </a:r>
+                <a:r>
+                  <a:rPr lang="it-IT" altLang="it-IT" sz="1700" dirty="0"/>
+                  <a:t> usando il CIS come set target e in maniera da ottenere le disuguaglianze (</a:t>
+                </a:r>
+                <a:r>
+                  <a:rPr lang="it-IT" altLang="it-IT" sz="1700" dirty="0" err="1"/>
+                  <a:t>Np_steps_H</a:t>
+                </a:r>
+                <a:r>
+                  <a:rPr lang="it-IT" altLang="it-IT" sz="1700" dirty="0"/>
+                  <a:t>, </a:t>
+                </a:r>
+                <a:r>
+                  <a:rPr lang="it-IT" altLang="it-IT" sz="1700" dirty="0" err="1"/>
+                  <a:t>Np_steps_h</a:t>
+                </a:r>
+                <a:r>
+                  <a:rPr lang="it-IT" altLang="it-IT" sz="1700" dirty="0"/>
+                  <a:t>) che definiscono il poliedro di tutti gli stati da cui in al massimo 3 mosse, rispettando i vincoli, si entra nel CIS. Viene trasformato questo risultato in un oggetto </a:t>
+                </a:r>
+                <a:r>
+                  <a:rPr lang="it-IT" altLang="it-IT" sz="1700" dirty="0" err="1"/>
+                  <a:t>Polyhedron</a:t>
+                </a:r>
+                <a:r>
+                  <a:rPr lang="it-IT" altLang="it-IT" sz="1700" dirty="0"/>
+                  <a:t> proiettando la regione sui piani </a:t>
+                </a:r>
+                <a:r>
+                  <a:rPr lang="it-IT" sz="1800" dirty="0"/>
+                  <a:t>(</a:t>
+                </a:r>
+                <a14:m>
+                  <m:oMath xmlns:m="http://schemas.openxmlformats.org/officeDocument/2006/math">
+                    <m:sSub>
+                      <m:sSubPr>
+                        <m:ctrlPr>
+                          <a:rPr lang="it-IT" sz="1800" i="1" dirty="0">
+                            <a:latin typeface="Cambria Math" panose="02040503050406030204" pitchFamily="18" charset="0"/>
+                          </a:rPr>
+                        </m:ctrlPr>
+                      </m:sSubPr>
+                      <m:e>
+                        <m:r>
+                          <a:rPr lang="it-IT" sz="1800" i="1" dirty="0">
+                            <a:latin typeface="Cambria Math" panose="02040503050406030204" pitchFamily="18" charset="0"/>
+                          </a:rPr>
+                          <m:t>h</m:t>
+                        </m:r>
+                      </m:e>
+                      <m:sub>
+                        <m:r>
+                          <a:rPr lang="it-IT" sz="1800" i="1" dirty="0">
+                            <a:latin typeface="Cambria Math" panose="02040503050406030204" pitchFamily="18" charset="0"/>
+                          </a:rPr>
+                          <m:t>1</m:t>
+                        </m:r>
+                      </m:sub>
+                    </m:sSub>
+                  </m:oMath>
+                </a14:m>
+                <a:r>
+                  <a:rPr lang="it-IT" sz="1800" dirty="0"/>
+                  <a:t>, </a:t>
+                </a:r>
+                <a14:m>
+                  <m:oMath xmlns:m="http://schemas.openxmlformats.org/officeDocument/2006/math">
+                    <m:sSub>
+                      <m:sSubPr>
+                        <m:ctrlPr>
+                          <a:rPr lang="it-IT" sz="1800" i="1" dirty="0">
+                            <a:latin typeface="Cambria Math" panose="02040503050406030204" pitchFamily="18" charset="0"/>
+                          </a:rPr>
+                        </m:ctrlPr>
+                      </m:sSubPr>
+                      <m:e>
+                        <m:r>
+                          <a:rPr lang="it-IT" sz="1800" i="1" dirty="0">
+                            <a:latin typeface="Cambria Math" panose="02040503050406030204" pitchFamily="18" charset="0"/>
+                          </a:rPr>
+                          <m:t>h</m:t>
+                        </m:r>
+                      </m:e>
+                      <m:sub>
+                        <m:r>
+                          <a:rPr lang="it-IT" sz="1800" i="1" dirty="0">
+                            <a:latin typeface="Cambria Math" panose="02040503050406030204" pitchFamily="18" charset="0"/>
+                          </a:rPr>
+                          <m:t>3</m:t>
+                        </m:r>
+                      </m:sub>
+                    </m:sSub>
+                  </m:oMath>
+                </a14:m>
+                <a:r>
+                  <a:rPr lang="it-IT" sz="1800" dirty="0"/>
+                  <a:t>) e (</a:t>
+                </a:r>
+                <a14:m>
+                  <m:oMath xmlns:m="http://schemas.openxmlformats.org/officeDocument/2006/math">
+                    <m:sSub>
+                      <m:sSubPr>
+                        <m:ctrlPr>
+                          <a:rPr lang="it-IT" sz="1800" i="1" dirty="0">
+                            <a:latin typeface="Cambria Math" panose="02040503050406030204" pitchFamily="18" charset="0"/>
+                          </a:rPr>
+                        </m:ctrlPr>
+                      </m:sSubPr>
+                      <m:e>
+                        <m:r>
+                          <a:rPr lang="it-IT" sz="1800" i="1" dirty="0">
+                            <a:latin typeface="Cambria Math" panose="02040503050406030204" pitchFamily="18" charset="0"/>
+                          </a:rPr>
+                          <m:t>h</m:t>
+                        </m:r>
+                      </m:e>
+                      <m:sub>
+                        <m:r>
+                          <a:rPr lang="it-IT" sz="1800" i="1" dirty="0">
+                            <a:latin typeface="Cambria Math" panose="02040503050406030204" pitchFamily="18" charset="0"/>
+                          </a:rPr>
+                          <m:t>2</m:t>
+                        </m:r>
+                      </m:sub>
+                    </m:sSub>
+                  </m:oMath>
+                </a14:m>
+                <a:r>
+                  <a:rPr lang="it-IT" sz="1800" dirty="0"/>
+                  <a:t>, </a:t>
+                </a:r>
+                <a14:m>
+                  <m:oMath xmlns:m="http://schemas.openxmlformats.org/officeDocument/2006/math">
+                    <m:sSub>
+                      <m:sSubPr>
+                        <m:ctrlPr>
+                          <a:rPr lang="it-IT" sz="1800" i="1" dirty="0">
+                            <a:latin typeface="Cambria Math" panose="02040503050406030204" pitchFamily="18" charset="0"/>
+                          </a:rPr>
+                        </m:ctrlPr>
+                      </m:sSubPr>
+                      <m:e>
+                        <m:r>
+                          <a:rPr lang="it-IT" sz="1800" i="1" dirty="0">
+                            <a:latin typeface="Cambria Math" panose="02040503050406030204" pitchFamily="18" charset="0"/>
+                          </a:rPr>
+                          <m:t>h</m:t>
+                        </m:r>
+                      </m:e>
+                      <m:sub>
+                        <m:r>
+                          <a:rPr lang="it-IT" sz="1800" i="1" dirty="0">
+                            <a:latin typeface="Cambria Math" panose="02040503050406030204" pitchFamily="18" charset="0"/>
+                          </a:rPr>
+                          <m:t>4</m:t>
+                        </m:r>
+                      </m:sub>
+                    </m:sSub>
+                  </m:oMath>
+                </a14:m>
+                <a:r>
+                  <a:rPr lang="it-IT" sz="1800" dirty="0"/>
+                  <a:t>).</a:t>
+                </a:r>
+              </a:p>
+              <a:p>
+                <a:pPr marL="0" lvl="0" indent="0" algn="just" eaLnBrk="0" fontAlgn="base" hangingPunct="0">
+                  <a:lnSpc>
+                    <a:spcPct val="100000"/>
+                  </a:lnSpc>
+                  <a:spcBef>
+                    <a:spcPct val="0"/>
+                  </a:spcBef>
+                  <a:spcAft>
+                    <a:spcPct val="0"/>
+                  </a:spcAft>
+                  <a:buNone/>
+                </a:pPr>
+                <a:endParaRPr lang="it-IT" sz="1800" dirty="0"/>
+              </a:p>
+              <a:p>
+                <a:pPr marL="0" lvl="0" indent="0" algn="just" eaLnBrk="0" fontAlgn="base" hangingPunct="0">
+                  <a:lnSpc>
+                    <a:spcPct val="100000"/>
+                  </a:lnSpc>
+                  <a:spcBef>
+                    <a:spcPct val="0"/>
+                  </a:spcBef>
+                  <a:spcAft>
+                    <a:spcPct val="0"/>
+                  </a:spcAft>
+                  <a:buNone/>
+                </a:pPr>
+                <a:r>
+                  <a:rPr lang="it-IT" altLang="it-IT" sz="1700" dirty="0"/>
+                  <a:t>Nei due </a:t>
+                </a:r>
+                <a:r>
+                  <a:rPr lang="it-IT" altLang="it-IT" sz="1700" dirty="0" err="1"/>
+                  <a:t>subplot</a:t>
+                </a:r>
+                <a:r>
+                  <a:rPr lang="it-IT" altLang="it-IT" sz="1700" dirty="0"/>
+                  <a:t> vengono visualizzati insieme il CIS e l’N-step set e si può osservare che l’N-step </a:t>
+                </a:r>
+                <a:r>
+                  <a:rPr lang="it-IT" altLang="it-IT" sz="1700" dirty="0" err="1"/>
+                  <a:t>controllable</a:t>
+                </a:r>
+                <a:r>
+                  <a:rPr lang="it-IT" altLang="it-IT" sz="1700" dirty="0"/>
+                  <a:t> set ingloba il CIS e si estende al di fuori: quelle aree extra rappresentano combinazioni di livelli iniziali non stazionarie ma comunque riportabili in sicurezza in 3 passi. </a:t>
+                </a:r>
+                <a:endParaRPr lang="it-IT" sz="2200" dirty="0"/>
+              </a:p>
+            </p:txBody>
+          </p:sp>
+        </mc:Choice>
+        <mc:Fallback>
+          <p:sp>
+            <p:nvSpPr>
+              <p:cNvPr id="3" name="Segnaposto contenuto 2">
+                <a:extLst>
+                  <a:ext uri="{FF2B5EF4-FFF2-40B4-BE49-F238E27FC236}">
+                    <a16:creationId xmlns:a16="http://schemas.microsoft.com/office/drawing/2014/main" id="{1AB11CCA-47B4-9509-7533-3E635B5D12DE}"/>
+                  </a:ext>
+                </a:extLst>
+              </p:cNvPr>
+              <p:cNvSpPr>
+                <a:spLocks noGrp="1" noRot="1" noChangeAspect="1" noMove="1" noResize="1" noEditPoints="1" noAdjustHandles="1" noChangeArrowheads="1" noChangeShapeType="1" noTextEdit="1"/>
+              </p:cNvSpPr>
+              <p:nvPr>
+                <p:ph idx="1"/>
+              </p:nvPr>
+            </p:nvSpPr>
+            <p:spPr>
+              <a:xfrm>
+                <a:off x="640080" y="2706624"/>
+                <a:ext cx="6894576" cy="3483864"/>
+              </a:xfrm>
+              <a:blipFill>
+                <a:blip r:embed="rId2"/>
+                <a:stretch>
+                  <a:fillRect l="-531" t="-350" r="-531"/>
+                </a:stretch>
+              </a:blipFill>
+            </p:spPr>
+            <p:txBody>
+              <a:bodyPr/>
+              <a:lstStyle/>
+              <a:p>
+                <a:r>
+                  <a:rPr lang="it-IT">
+                    <a:noFill/>
+                  </a:rPr>
+                  <a:t> </a:t>
+                </a:r>
+              </a:p>
+            </p:txBody>
+          </p:sp>
+        </mc:Fallback>
+      </mc:AlternateContent>
       <p:pic>
         <p:nvPicPr>
           <p:cNvPr id="6" name="Immagine 5">
@@ -11306,15 +11844,20 @@
           <p:nvPr/>
         </p:nvPicPr>
         <p:blipFill>
-          <a:blip r:embed="rId2"/>
-          <a:stretch>
-            <a:fillRect/>
-          </a:stretch>
+          <a:blip r:embed="rId3">
+            <a:extLst>
+              <a:ext uri="{28A0092B-C50C-407E-A947-70E740481C1C}">
+                <a14:useLocalDpi xmlns:a14="http://schemas.microsoft.com/office/drawing/2010/main" val="0"/>
+              </a:ext>
+            </a:extLst>
+          </a:blip>
+          <a:srcRect/>
+          <a:stretch/>
         </p:blipFill>
         <p:spPr>
           <a:xfrm>
-            <a:off x="8369777" y="329183"/>
-            <a:ext cx="3360233" cy="3099815"/>
+            <a:off x="9315672" y="147703"/>
+            <a:ext cx="2710908" cy="3099815"/>
           </a:xfrm>
           <a:prstGeom prst="rect">
             <a:avLst/>
@@ -11336,15 +11879,20 @@
           <p:nvPr/>
         </p:nvPicPr>
         <p:blipFill>
-          <a:blip r:embed="rId3"/>
-          <a:stretch>
-            <a:fillRect/>
-          </a:stretch>
+          <a:blip r:embed="rId4">
+            <a:extLst>
+              <a:ext uri="{28A0092B-C50C-407E-A947-70E740481C1C}">
+                <a14:useLocalDpi xmlns:a14="http://schemas.microsoft.com/office/drawing/2010/main" val="0"/>
+              </a:ext>
+            </a:extLst>
+          </a:blip>
+          <a:srcRect/>
+          <a:stretch/>
         </p:blipFill>
         <p:spPr>
           <a:xfrm>
-            <a:off x="8385938" y="3429000"/>
-            <a:ext cx="3360233" cy="3099816"/>
+            <a:off x="9315672" y="3429000"/>
+            <a:ext cx="2710908" cy="3099816"/>
           </a:xfrm>
           <a:prstGeom prst="rect">
             <a:avLst/>
@@ -11527,15 +12075,7 @@
             </a:r>
             <a:r>
               <a:rPr lang="it-IT" sz="5000" dirty="0"/>
-              <a:t> Control (</a:t>
-            </a:r>
-            <a:r>
-              <a:rPr lang="it-IT" sz="5000" dirty="0" err="1"/>
-              <a:t>mpc</a:t>
-            </a:r>
-            <a:r>
-              <a:rPr lang="it-IT" sz="5000" dirty="0"/>
-              <a:t>)</a:t>
+              <a:t> Control (MPC)</a:t>
             </a:r>
           </a:p>
         </p:txBody>
@@ -11831,8 +12371,8 @@
         </p:nvSpPr>
         <p:spPr>
           <a:xfrm>
-            <a:off x="630936" y="2660904"/>
-            <a:ext cx="4818888" cy="3547872"/>
+            <a:off x="630935" y="2660904"/>
+            <a:ext cx="5198841" cy="3547872"/>
           </a:xfrm>
         </p:spPr>
         <p:txBody>
@@ -11841,7 +12381,7 @@
           </a:bodyPr>
           <a:lstStyle/>
           <a:p>
-            <a:pPr marL="0" lvl="0" indent="0" eaLnBrk="0" fontAlgn="base" hangingPunct="0">
+            <a:pPr marL="0" lvl="0" indent="0" algn="just" eaLnBrk="0" fontAlgn="base" hangingPunct="0">
               <a:spcBef>
                 <a:spcPct val="0"/>
               </a:spcBef>
@@ -11864,7 +12404,7 @@
             </a:r>
           </a:p>
           <a:p>
-            <a:pPr marL="0" lvl="0" indent="0" eaLnBrk="0" fontAlgn="base" hangingPunct="0">
+            <a:pPr marL="0" lvl="0" indent="0" algn="just" eaLnBrk="0" fontAlgn="base" hangingPunct="0">
               <a:spcBef>
                 <a:spcPct val="0"/>
               </a:spcBef>
@@ -11887,7 +12427,7 @@
             </a:r>
           </a:p>
           <a:p>
-            <a:pPr marL="0" lvl="0" indent="0" eaLnBrk="0" fontAlgn="base" hangingPunct="0">
+            <a:pPr marL="0" lvl="0" indent="0" algn="just" eaLnBrk="0" fontAlgn="base" hangingPunct="0">
               <a:spcBef>
                 <a:spcPct val="0"/>
               </a:spcBef>
@@ -11902,7 +12442,7 @@
             </a:r>
           </a:p>
           <a:p>
-            <a:pPr marL="0" lvl="0" indent="0" eaLnBrk="0" fontAlgn="base" hangingPunct="0">
+            <a:pPr marL="0" lvl="0" indent="0" algn="just" eaLnBrk="0" fontAlgn="base" hangingPunct="0">
               <a:spcBef>
                 <a:spcPct val="0"/>
               </a:spcBef>
@@ -12123,7 +12663,7 @@
           <a:lstStyle/>
           <a:p>
             <a:r>
-              <a:rPr lang="it-IT" sz="5400"/>
+              <a:rPr lang="it-IT" sz="5400" dirty="0"/>
               <a:t>Simulazione MPC</a:t>
             </a:r>
           </a:p>
@@ -12490,8 +13030,8 @@
         </p:nvSpPr>
         <p:spPr>
           <a:xfrm>
-            <a:off x="640080" y="2706624"/>
-            <a:ext cx="6894576" cy="3483864"/>
+            <a:off x="640079" y="2706624"/>
+            <a:ext cx="7812885" cy="3483864"/>
           </a:xfrm>
         </p:spPr>
         <p:txBody>
@@ -12500,15 +13040,43 @@
           </a:bodyPr>
           <a:lstStyle/>
           <a:p>
-            <a:pPr marL="0" indent="0">
+            <a:pPr marL="0" indent="0" algn="just">
+              <a:lnSpc>
+                <a:spcPct val="100000"/>
+              </a:lnSpc>
               <a:buNone/>
             </a:pPr>
             <a:r>
               <a:rPr lang="it-IT" sz="2000" dirty="0"/>
-              <a:t>Durante la simulazione, il controllore MPC calcola l’ingresso ottimale a ogni istante, tenendo conto dello stato attuale e dei vincoli imposti. L’ingresso viene applicato al sistema non lineare reale, aggiornando il suo comportamento passo dopo passo. I grafici mostrano che le traiettorie restano all’interno dei vincoli (CIS) e convergono verso il riferimento, garantendo una risposta corretta anche in presenza di una dinamica non lineare.</a:t>
-            </a:r>
-          </a:p>
-          <a:p>
+              <a:t>Durante la simulazione, il controllore MPC calcola l’ingresso ottimale a ogni istante, tenendo conto dello stato attuale e dei vincoli imposti.</a:t>
+            </a:r>
+          </a:p>
+          <a:p>
+            <a:pPr marL="0" indent="0" algn="just">
+              <a:lnSpc>
+                <a:spcPct val="100000"/>
+              </a:lnSpc>
+              <a:buNone/>
+            </a:pPr>
+            <a:r>
+              <a:rPr lang="it-IT" sz="2000" dirty="0"/>
+              <a:t>L’ingresso viene applicato al sistema non lineare reale, aggiornando il suo comportamento passo dopo passo.</a:t>
+            </a:r>
+          </a:p>
+          <a:p>
+            <a:pPr marL="0" indent="0" algn="just">
+              <a:lnSpc>
+                <a:spcPct val="100000"/>
+              </a:lnSpc>
+              <a:buNone/>
+            </a:pPr>
+            <a:r>
+              <a:rPr lang="it-IT" sz="2000" dirty="0"/>
+              <a:t>I grafici mostrano che le traiettorie restano all’interno dei vincoli (CIS) e convergono verso il riferimento, garantendo una risposta corretta anche in presenza di una dinamica non lineare.</a:t>
+            </a:r>
+          </a:p>
+          <a:p>
+            <a:pPr algn="just"/>
             <a:endParaRPr lang="it-IT" sz="2200" dirty="0"/>
           </a:p>
         </p:txBody>
@@ -12528,15 +13096,20 @@
           <p:nvPr/>
         </p:nvPicPr>
         <p:blipFill>
-          <a:blip r:embed="rId2"/>
-          <a:stretch>
-            <a:fillRect/>
-          </a:stretch>
+          <a:blip r:embed="rId2">
+            <a:extLst>
+              <a:ext uri="{28A0092B-C50C-407E-A947-70E740481C1C}">
+                <a14:useLocalDpi xmlns:a14="http://schemas.microsoft.com/office/drawing/2010/main" val="0"/>
+              </a:ext>
+            </a:extLst>
+          </a:blip>
+          <a:srcRect/>
+          <a:stretch/>
         </p:blipFill>
         <p:spPr>
           <a:xfrm>
-            <a:off x="8778839" y="108317"/>
-            <a:ext cx="3058118" cy="3252104"/>
+            <a:off x="9171502" y="108317"/>
+            <a:ext cx="2846088" cy="3252104"/>
           </a:xfrm>
           <a:prstGeom prst="rect">
             <a:avLst/>
@@ -12558,15 +13131,20 @@
           <p:nvPr/>
         </p:nvPicPr>
         <p:blipFill>
-          <a:blip r:embed="rId3"/>
-          <a:stretch>
-            <a:fillRect/>
-          </a:stretch>
+          <a:blip r:embed="rId3">
+            <a:extLst>
+              <a:ext uri="{28A0092B-C50C-407E-A947-70E740481C1C}">
+                <a14:useLocalDpi xmlns:a14="http://schemas.microsoft.com/office/drawing/2010/main" val="0"/>
+              </a:ext>
+            </a:extLst>
+          </a:blip>
+          <a:srcRect/>
+          <a:stretch/>
         </p:blipFill>
         <p:spPr>
           <a:xfrm>
-            <a:off x="8778838" y="3360419"/>
-            <a:ext cx="3058119" cy="3463851"/>
+            <a:off x="9171502" y="3472099"/>
+            <a:ext cx="2846088" cy="3250800"/>
           </a:xfrm>
           <a:prstGeom prst="rect">
             <a:avLst/>
@@ -12740,7 +13318,7 @@
           <a:lstStyle/>
           <a:p>
             <a:r>
-              <a:rPr lang="it-IT" sz="5400"/>
+              <a:rPr lang="it-IT" sz="5400" dirty="0"/>
               <a:t>Andamento degli stati e degli ingressi</a:t>
             </a:r>
           </a:p>
@@ -13108,34 +13686,87 @@
         <p:spPr>
           <a:xfrm>
             <a:off x="612648" y="2504819"/>
-            <a:ext cx="6986016" cy="3672144"/>
+            <a:ext cx="5941268" cy="3884672"/>
           </a:xfrm>
         </p:spPr>
         <p:txBody>
           <a:bodyPr>
-            <a:normAutofit lnSpcReduction="10000"/>
+            <a:normAutofit fontScale="92500" lnSpcReduction="20000"/>
           </a:bodyPr>
           <a:lstStyle/>
           <a:p>
-            <a:pPr marL="0" indent="0">
+            <a:pPr marL="0" indent="0" algn="just">
+              <a:lnSpc>
+                <a:spcPct val="120000"/>
+              </a:lnSpc>
               <a:buNone/>
             </a:pPr>
             <a:r>
-              <a:rPr lang="it-IT" sz="2200" dirty="0"/>
-              <a:t>Nel primo grafico sono riportati gli ingressi di controllo, l’azione iniziale è più decisa per correggere rapidamente la dinamica del sistema, ma si attenua progressivamente man mano che ci si avvicina al riferimento.</a:t>
-            </a:r>
-          </a:p>
-          <a:p>
-            <a:pPr marL="0" indent="0">
+              <a:rPr lang="it-IT" sz="1600" u="sng" dirty="0"/>
+              <a:t>Grafico 1 – Andamento degli stati</a:t>
+            </a:r>
+          </a:p>
+          <a:p>
+            <a:pPr algn="just">
+              <a:lnSpc>
+                <a:spcPct val="120000"/>
+              </a:lnSpc>
+            </a:pPr>
+            <a:r>
+              <a:rPr lang="it-IT" sz="1600" dirty="0"/>
+              <a:t>Mostra l’evoluzione nel tempo dei livelli nei quattro serbatoi includendo anche i rispettivi riferimenti.</a:t>
+            </a:r>
+          </a:p>
+          <a:p>
+            <a:pPr algn="just">
+              <a:lnSpc>
+                <a:spcPct val="120000"/>
+              </a:lnSpc>
+            </a:pPr>
+            <a:r>
+              <a:rPr lang="it-IT" sz="1600" dirty="0"/>
+              <a:t>Nei primi minuti di simulazione si osserva un superamento temporaneo del livello di riferimento per i serbatoi 1,3 e 4. Il livello del serbatoio 2, invece, raggiunge rapidamente il valore di riferimento senza superarlo, coerentemente con la priorità assegnata alla funzione di costo.</a:t>
+            </a:r>
+          </a:p>
+          <a:p>
+            <a:pPr marL="0" indent="0" algn="just">
+              <a:lnSpc>
+                <a:spcPct val="120000"/>
+              </a:lnSpc>
               <a:buNone/>
             </a:pPr>
             <a:r>
-              <a:rPr lang="it-IT" sz="2200" dirty="0"/>
-              <a:t>Nel secondo grafico viene mostrato l’andamento degli stati del sistema nel tempo. Si osserva che tutte le variabili restano sempre entro i limiti imposti e si avvicinano in modo graduale e regolare ai valori di riferimento. Questo dimostra l’efficacia della strategia MPC nel guidare il sistema verso l’obiettivo senza oscillazioni né violazioni.</a:t>
-            </a:r>
-          </a:p>
-          <a:p>
-            <a:pPr marL="0" indent="0">
+              <a:rPr lang="it-IT" sz="1600" u="sng" dirty="0"/>
+              <a:t>Grafico 2 – Ingressi di controllo</a:t>
+            </a:r>
+          </a:p>
+          <a:p>
+            <a:pPr algn="just">
+              <a:lnSpc>
+                <a:spcPct val="120000"/>
+              </a:lnSpc>
+            </a:pPr>
+            <a:r>
+              <a:rPr lang="it-IT" sz="1600" dirty="0"/>
+              <a:t>Mostra l’andamento delle tensioni applicate alle pompe u1 e u2.</a:t>
+            </a:r>
+          </a:p>
+          <a:p>
+            <a:pPr algn="just">
+              <a:lnSpc>
+                <a:spcPct val="120000"/>
+              </a:lnSpc>
+            </a:pPr>
+            <a:r>
+              <a:rPr lang="it-IT" sz="1600" dirty="0"/>
+              <a:t>Si nota che per un breve periodo di tempo si ha una saturazione sul controllo dovuta dalla differenza elevata del livello del serbatoio 2 dal suo riferimento.</a:t>
+            </a:r>
+          </a:p>
+          <a:p>
+            <a:pPr marL="0" indent="0" algn="just">
+              <a:lnSpc>
+                <a:spcPct val="120000"/>
+              </a:lnSpc>
               <a:buNone/>
             </a:pPr>
             <a:endParaRPr lang="it-IT" sz="2200" dirty="0"/>
@@ -13165,7 +13796,7 @@
         </p:blipFill>
         <p:spPr>
           <a:xfrm>
-            <a:off x="8686237" y="70468"/>
+            <a:off x="8686237" y="217048"/>
             <a:ext cx="2893115" cy="2954644"/>
           </a:xfrm>
           <a:prstGeom prst="rect">
@@ -13173,87 +13804,6 @@
           </a:prstGeom>
         </p:spPr>
       </p:pic>
-      <p:grpSp>
-        <p:nvGrpSpPr>
-          <p:cNvPr id="11" name="Gruppo 10">
-            <a:extLst>
-              <a:ext uri="{FF2B5EF4-FFF2-40B4-BE49-F238E27FC236}">
-                <a16:creationId xmlns:a16="http://schemas.microsoft.com/office/drawing/2014/main" id="{D8CF0733-353F-2E63-EE8F-F8B82C457062}"/>
-              </a:ext>
-            </a:extLst>
-          </p:cNvPr>
-          <p:cNvGrpSpPr/>
-          <p:nvPr/>
-        </p:nvGrpSpPr>
-        <p:grpSpPr>
-          <a:xfrm>
-            <a:off x="7598663" y="3117438"/>
-            <a:ext cx="4518021" cy="3102387"/>
-            <a:chOff x="7798372" y="3204499"/>
-            <a:chExt cx="4152836" cy="2690249"/>
-          </a:xfrm>
-        </p:grpSpPr>
-        <p:pic>
-          <p:nvPicPr>
-            <p:cNvPr id="10" name="Immagine 9">
-              <a:extLst>
-                <a:ext uri="{FF2B5EF4-FFF2-40B4-BE49-F238E27FC236}">
-                  <a16:creationId xmlns:a16="http://schemas.microsoft.com/office/drawing/2014/main" id="{9B19564C-9399-6ECC-A1A3-FA5D58115E29}"/>
-                </a:ext>
-              </a:extLst>
-            </p:cNvPr>
-            <p:cNvPicPr>
-              <a:picLocks noChangeAspect="1"/>
-            </p:cNvPicPr>
-            <p:nvPr/>
-          </p:nvPicPr>
-          <p:blipFill>
-            <a:blip r:embed="rId3"/>
-            <a:stretch>
-              <a:fillRect/>
-            </a:stretch>
-          </p:blipFill>
-          <p:spPr>
-            <a:xfrm>
-              <a:off x="7836408" y="3204499"/>
-              <a:ext cx="4114800" cy="1296162"/>
-            </a:xfrm>
-            <a:prstGeom prst="rect">
-              <a:avLst/>
-            </a:prstGeom>
-          </p:spPr>
-        </p:pic>
-        <p:pic>
-          <p:nvPicPr>
-            <p:cNvPr id="8" name="Immagine 7">
-              <a:extLst>
-                <a:ext uri="{FF2B5EF4-FFF2-40B4-BE49-F238E27FC236}">
-                  <a16:creationId xmlns:a16="http://schemas.microsoft.com/office/drawing/2014/main" id="{374797C8-43E3-A256-9601-755B8BF55309}"/>
-                </a:ext>
-              </a:extLst>
-            </p:cNvPr>
-            <p:cNvPicPr>
-              <a:picLocks noChangeAspect="1"/>
-            </p:cNvPicPr>
-            <p:nvPr/>
-          </p:nvPicPr>
-          <p:blipFill>
-            <a:blip r:embed="rId4"/>
-            <a:stretch>
-              <a:fillRect/>
-            </a:stretch>
-          </p:blipFill>
-          <p:spPr>
-            <a:xfrm>
-              <a:off x="7798372" y="4598586"/>
-              <a:ext cx="4114801" cy="1296162"/>
-            </a:xfrm>
-            <a:prstGeom prst="rect">
-              <a:avLst/>
-            </a:prstGeom>
-          </p:spPr>
-        </p:pic>
-      </p:grpSp>
       <p:sp>
         <p:nvSpPr>
           <p:cNvPr id="4" name="Segnaposto piè di pagina 3">
@@ -13294,6 +13844,41 @@
           </a:p>
         </p:txBody>
       </p:sp>
+      <p:pic>
+        <p:nvPicPr>
+          <p:cNvPr id="7" name="Immagine 6">
+            <a:extLst>
+              <a:ext uri="{FF2B5EF4-FFF2-40B4-BE49-F238E27FC236}">
+                <a16:creationId xmlns:a16="http://schemas.microsoft.com/office/drawing/2014/main" id="{66D0226E-61AE-2637-8D53-2FA7E92EFF11}"/>
+              </a:ext>
+            </a:extLst>
+          </p:cNvPr>
+          <p:cNvPicPr>
+            <a:picLocks noChangeAspect="1"/>
+          </p:cNvPicPr>
+          <p:nvPr/>
+        </p:nvPicPr>
+        <p:blipFill>
+          <a:blip r:embed="rId3">
+            <a:extLst>
+              <a:ext uri="{28A0092B-C50C-407E-A947-70E740481C1C}">
+                <a14:useLocalDpi xmlns:a14="http://schemas.microsoft.com/office/drawing/2010/main" val="0"/>
+              </a:ext>
+            </a:extLst>
+          </a:blip>
+          <a:srcRect/>
+          <a:stretch/>
+        </p:blipFill>
+        <p:spPr>
+          <a:xfrm>
+            <a:off x="6638126" y="3329186"/>
+            <a:ext cx="5455073" cy="2688362"/>
+          </a:xfrm>
+          <a:prstGeom prst="rect">
+            <a:avLst/>
+          </a:prstGeom>
+        </p:spPr>
+      </p:pic>
     </p:spTree>
     <p:extLst>
       <p:ext uri="{BB962C8B-B14F-4D97-AF65-F5344CB8AC3E}">
@@ -20319,7 +20904,7 @@
           <a:lstStyle/>
           <a:p>
             <a:r>
-              <a:rPr lang="it-IT" sz="5400"/>
+              <a:rPr lang="it-IT" sz="5400" dirty="0"/>
               <a:t>Obiettivi di progetto</a:t>
             </a:r>
           </a:p>
@@ -21039,7 +21624,7 @@
               <a:tabLst/>
             </a:pPr>
             <a:r>
-              <a:rPr kumimoji="0" lang="it-IT" altLang="it-IT" sz="2200" i="0" u="none" strike="noStrike" cap="none" normalizeH="0" baseline="0">
+              <a:rPr kumimoji="0" lang="it-IT" altLang="it-IT" sz="2200" i="0" u="none" strike="noStrike" cap="none" normalizeH="0" baseline="0" dirty="0">
                 <a:ln>
                   <a:noFill/>
                 </a:ln>
@@ -21048,7 +21633,7 @@
               <a:t>Progettare un controllore MPC  per portare il sistema da (h1,h2,h3,h4)=(1.3767, 2.2772, 0.8386, 0.5604)</a:t>
             </a:r>
             <a:br>
-              <a:rPr kumimoji="0" lang="it-IT" altLang="it-IT" sz="2200" i="0" u="none" strike="noStrike" cap="none" normalizeH="0" baseline="0">
+              <a:rPr kumimoji="0" lang="it-IT" altLang="it-IT" sz="2200" i="0" u="none" strike="noStrike" cap="none" normalizeH="0" baseline="0" dirty="0">
                 <a:ln>
                   <a:noFill/>
                 </a:ln>
@@ -21056,7 +21641,7 @@
               </a:rPr>
             </a:br>
             <a:r>
-              <a:rPr kumimoji="0" lang="it-IT" altLang="it-IT" sz="2200" i="0" u="none" strike="noStrike" cap="none" normalizeH="0" baseline="0">
+              <a:rPr kumimoji="0" lang="it-IT" altLang="it-IT" sz="2200" i="0" u="none" strike="noStrike" cap="none" normalizeH="0" baseline="0" dirty="0">
                 <a:ln>
                   <a:noFill/>
                 </a:ln>
@@ -21065,11 +21650,11 @@
               <a:t>all’equilibrio desiderato (7.8253, 18.7323, 3.3545, 7.8801)</a:t>
             </a:r>
             <a:r>
-              <a:rPr lang="it-IT" altLang="it-IT" sz="2200"/>
+              <a:rPr lang="it-IT" altLang="it-IT" sz="2200" dirty="0"/>
               <a:t> </a:t>
             </a:r>
             <a:r>
-              <a:rPr kumimoji="0" lang="it-IT" altLang="it-IT" sz="2200" i="0" u="none" strike="noStrike" cap="none" normalizeH="0" baseline="0">
+              <a:rPr kumimoji="0" lang="it-IT" altLang="it-IT" sz="2200" i="0" u="none" strike="noStrike" cap="none" normalizeH="0" baseline="0" dirty="0">
                 <a:ln>
                   <a:noFill/>
                 </a:ln>
@@ -21093,7 +21678,7 @@
               <a:tabLst/>
             </a:pPr>
             <a:r>
-              <a:rPr kumimoji="0" lang="it-IT" altLang="it-IT" sz="2200" i="0" u="none" strike="noStrike" cap="none" normalizeH="0" baseline="0">
+              <a:rPr kumimoji="0" lang="it-IT" altLang="it-IT" sz="2200" i="0" u="none" strike="noStrike" cap="none" normalizeH="0" baseline="0" dirty="0">
                 <a:ln>
                   <a:noFill/>
                 </a:ln>
@@ -21117,7 +21702,7 @@
               <a:tabLst/>
             </a:pPr>
             <a:r>
-              <a:rPr kumimoji="0" lang="it-IT" altLang="it-IT" sz="2200" i="0" u="none" strike="noStrike" cap="none" normalizeH="0" baseline="0">
+              <a:rPr kumimoji="0" lang="it-IT" altLang="it-IT" sz="2200" i="0" u="none" strike="noStrike" cap="none" normalizeH="0" baseline="0" dirty="0">
                 <a:ln>
                   <a:noFill/>
                 </a:ln>
@@ -21141,7 +21726,7 @@
               <a:tabLst/>
             </a:pPr>
             <a:r>
-              <a:rPr kumimoji="0" lang="it-IT" altLang="it-IT" sz="2200" i="0" u="none" strike="noStrike" cap="none" normalizeH="0" baseline="0">
+              <a:rPr kumimoji="0" lang="it-IT" altLang="it-IT" sz="2200" i="0" u="none" strike="noStrike" cap="none" normalizeH="0" baseline="0" dirty="0">
                 <a:ln>
                   <a:noFill/>
                 </a:ln>
@@ -21165,7 +21750,7 @@
               <a:tabLst/>
             </a:pPr>
             <a:r>
-              <a:rPr kumimoji="0" lang="it-IT" altLang="it-IT" sz="2200" i="0" u="none" strike="noStrike" cap="none" normalizeH="0" baseline="0">
+              <a:rPr kumimoji="0" lang="it-IT" altLang="it-IT" sz="2200" i="0" u="none" strike="noStrike" cap="none" normalizeH="0" baseline="0" dirty="0">
                 <a:ln>
                   <a:noFill/>
                 </a:ln>
@@ -21189,7 +21774,7 @@
               <a:tabLst/>
             </a:pPr>
             <a:r>
-              <a:rPr kumimoji="0" lang="it-IT" altLang="it-IT" sz="2200" i="0" u="none" strike="noStrike" cap="none" normalizeH="0" baseline="0">
+              <a:rPr kumimoji="0" lang="it-IT" altLang="it-IT" sz="2200" i="0" u="none" strike="noStrike" cap="none" normalizeH="0" baseline="0" dirty="0">
                 <a:ln>
                   <a:noFill/>
                 </a:ln>
@@ -24430,7 +25015,7 @@
       </p:pic>
       <p:pic>
         <p:nvPicPr>
-          <p:cNvPr id="7" name="Immagine 6" descr="Immagine che contiene linea, Diagramma, diagramma, testo&#10;&#10;Il contenuto generato dall'IA potrebbe non essere corretto.">
+          <p:cNvPr id="7" name="Immagine 6">
             <a:extLst>
               <a:ext uri="{FF2B5EF4-FFF2-40B4-BE49-F238E27FC236}">
                 <a16:creationId xmlns:a16="http://schemas.microsoft.com/office/drawing/2014/main" id="{CF0676DF-4D88-4F13-6FF4-65CBB5C29B5C}"/>
@@ -24450,14 +25035,13 @@
               </a:ext>
             </a:extLst>
           </a:blip>
-          <a:stretch>
-            <a:fillRect/>
-          </a:stretch>
+          <a:srcRect/>
+          <a:stretch/>
         </p:blipFill>
         <p:spPr>
           <a:xfrm>
-            <a:off x="6198781" y="3787847"/>
-            <a:ext cx="5523082" cy="2005679"/>
+            <a:off x="6198781" y="4123300"/>
+            <a:ext cx="5523082" cy="1334772"/>
           </a:xfrm>
           <a:prstGeom prst="rect">
             <a:avLst/>

</xml_diff>